<commit_message>
update style for slide
</commit_message>
<xml_diff>
--- a/Document/presentation/bus/bus entity.pptx
+++ b/Document/presentation/bus/bus entity.pptx
@@ -8,35 +8,34 @@
     <p:sldId id="316" r:id="rId2"/>
     <p:sldId id="256" r:id="rId3"/>
     <p:sldId id="315" r:id="rId4"/>
-    <p:sldId id="258" r:id="rId5"/>
-    <p:sldId id="259" r:id="rId6"/>
-    <p:sldId id="300" r:id="rId7"/>
-    <p:sldId id="313" r:id="rId8"/>
-    <p:sldId id="271" r:id="rId9"/>
-    <p:sldId id="272" r:id="rId10"/>
-    <p:sldId id="273" r:id="rId11"/>
-    <p:sldId id="301" r:id="rId12"/>
-    <p:sldId id="314" r:id="rId13"/>
-    <p:sldId id="274" r:id="rId14"/>
-    <p:sldId id="275" r:id="rId15"/>
-    <p:sldId id="276" r:id="rId16"/>
-    <p:sldId id="277" r:id="rId17"/>
-    <p:sldId id="278" r:id="rId18"/>
-    <p:sldId id="305" r:id="rId19"/>
-    <p:sldId id="302" r:id="rId20"/>
-    <p:sldId id="306" r:id="rId21"/>
-    <p:sldId id="310" r:id="rId22"/>
-    <p:sldId id="303" r:id="rId23"/>
-    <p:sldId id="285" r:id="rId24"/>
-    <p:sldId id="307" r:id="rId25"/>
-    <p:sldId id="286" r:id="rId26"/>
-    <p:sldId id="309" r:id="rId27"/>
-    <p:sldId id="299" r:id="rId28"/>
-    <p:sldId id="308" r:id="rId29"/>
-    <p:sldId id="295" r:id="rId30"/>
-    <p:sldId id="289" r:id="rId31"/>
-    <p:sldId id="291" r:id="rId32"/>
-    <p:sldId id="298" r:id="rId33"/>
+    <p:sldId id="259" r:id="rId5"/>
+    <p:sldId id="300" r:id="rId6"/>
+    <p:sldId id="313" r:id="rId7"/>
+    <p:sldId id="271" r:id="rId8"/>
+    <p:sldId id="272" r:id="rId9"/>
+    <p:sldId id="273" r:id="rId10"/>
+    <p:sldId id="301" r:id="rId11"/>
+    <p:sldId id="314" r:id="rId12"/>
+    <p:sldId id="274" r:id="rId13"/>
+    <p:sldId id="275" r:id="rId14"/>
+    <p:sldId id="276" r:id="rId15"/>
+    <p:sldId id="277" r:id="rId16"/>
+    <p:sldId id="278" r:id="rId17"/>
+    <p:sldId id="305" r:id="rId18"/>
+    <p:sldId id="302" r:id="rId19"/>
+    <p:sldId id="306" r:id="rId20"/>
+    <p:sldId id="310" r:id="rId21"/>
+    <p:sldId id="303" r:id="rId22"/>
+    <p:sldId id="285" r:id="rId23"/>
+    <p:sldId id="307" r:id="rId24"/>
+    <p:sldId id="286" r:id="rId25"/>
+    <p:sldId id="309" r:id="rId26"/>
+    <p:sldId id="299" r:id="rId27"/>
+    <p:sldId id="308" r:id="rId28"/>
+    <p:sldId id="295" r:id="rId29"/>
+    <p:sldId id="289" r:id="rId30"/>
+    <p:sldId id="291" r:id="rId31"/>
+    <p:sldId id="298" r:id="rId32"/>
   </p:sldIdLst>
   <p:sldSz cx="9144000" cy="6858000" type="screen4x3"/>
   <p:notesSz cx="6858000" cy="9144000"/>
@@ -3004,6 +3003,46 @@
       </p:grpSpPr>
       <p:sp>
         <p:nvSpPr>
+          <p:cNvPr id="3" name="Rectangle 2"/>
+          <p:cNvSpPr/>
+          <p:nvPr/>
+        </p:nvSpPr>
+        <p:spPr>
+          <a:xfrm>
+            <a:off x="0" y="0"/>
+            <a:ext cx="9144000" cy="6858000"/>
+          </a:xfrm>
+          <a:prstGeom prst="rect">
+            <a:avLst/>
+          </a:prstGeom>
+        </p:spPr>
+        <p:style>
+          <a:lnRef idx="2">
+            <a:schemeClr val="accent1">
+              <a:shade val="50000"/>
+            </a:schemeClr>
+          </a:lnRef>
+          <a:fillRef idx="1">
+            <a:schemeClr val="accent1"/>
+          </a:fillRef>
+          <a:effectRef idx="0">
+            <a:schemeClr val="accent1"/>
+          </a:effectRef>
+          <a:fontRef idx="minor">
+            <a:schemeClr val="lt1"/>
+          </a:fontRef>
+        </p:style>
+        <p:txBody>
+          <a:bodyPr rtlCol="0" anchor="ctr"/>
+          <a:lstStyle/>
+          <a:p>
+            <a:pPr algn="ctr"/>
+            <a:endParaRPr lang="en-US"/>
+          </a:p>
+        </p:txBody>
+      </p:sp>
+      <p:sp>
+        <p:nvSpPr>
           <p:cNvPr id="2" name="Title 1"/>
           <p:cNvSpPr>
             <a:spLocks noGrp="1"/>
@@ -3025,10 +3064,18 @@
           <a:lstStyle/>
           <a:p>
             <a:r>
-              <a:rPr lang="en-US" sz="7200" dirty="0" smtClean="0"/>
+              <a:rPr lang="en-US" sz="7200" b="1" dirty="0" smtClean="0">
+                <a:solidFill>
+                  <a:schemeClr val="bg1"/>
+                </a:solidFill>
+              </a:rPr>
               <a:t>Building Entity</a:t>
             </a:r>
-            <a:endParaRPr lang="en-US" sz="7200" dirty="0"/>
+            <a:endParaRPr lang="en-US" sz="7200" b="1" dirty="0">
+              <a:solidFill>
+                <a:schemeClr val="bg1"/>
+              </a:solidFill>
+            </a:endParaRPr>
           </a:p>
         </p:txBody>
       </p:sp>
@@ -3046,1071 +3093,6 @@
 </file>
 
 <file path=ppt/slides/slide10.xml><?xml version="1.0" encoding="utf-8"?>
-<p:sld xmlns:a="http://schemas.openxmlformats.org/drawingml/2006/main" xmlns:r="http://schemas.openxmlformats.org/officeDocument/2006/relationships" xmlns:p="http://schemas.openxmlformats.org/presentationml/2006/main">
-  <p:cSld>
-    <p:spTree>
-      <p:nvGrpSpPr>
-        <p:cNvPr id="1" name=""/>
-        <p:cNvGrpSpPr/>
-        <p:nvPr/>
-      </p:nvGrpSpPr>
-      <p:grpSpPr>
-        <a:xfrm>
-          <a:off x="0" y="0"/>
-          <a:ext cx="0" cy="0"/>
-          <a:chOff x="0" y="0"/>
-          <a:chExt cx="0" cy="0"/>
-        </a:xfrm>
-      </p:grpSpPr>
-      <p:graphicFrame>
-        <p:nvGraphicFramePr>
-          <p:cNvPr id="10" name="Table 9"/>
-          <p:cNvGraphicFramePr>
-            <a:graphicFrameLocks noGrp="1"/>
-          </p:cNvGraphicFramePr>
-          <p:nvPr>
-            <p:extLst>
-              <p:ext uri="{D42A27DB-BD31-4B8C-83A1-F6EECF244321}">
-                <p14:modId xmlns:p14="http://schemas.microsoft.com/office/powerpoint/2010/main" val="1905963055"/>
-              </p:ext>
-            </p:extLst>
-          </p:nvPr>
-        </p:nvGraphicFramePr>
-        <p:xfrm>
-          <a:off x="106679" y="81588"/>
-          <a:ext cx="5501641" cy="6187440"/>
-        </p:xfrm>
-        <a:graphic>
-          <a:graphicData uri="http://schemas.openxmlformats.org/drawingml/2006/table">
-            <a:tbl>
-              <a:tblPr firstRow="1" bandRow="1">
-                <a:tableStyleId>{5C22544A-7EE6-4342-B048-85BDC9FD1C3A}</a:tableStyleId>
-              </a:tblPr>
-              <a:tblGrid>
-                <a:gridCol w="727002"/>
-                <a:gridCol w="4774639"/>
-              </a:tblGrid>
-              <a:tr h="360336">
-                <a:tc>
-                  <a:txBody>
-                    <a:bodyPr/>
-                    <a:lstStyle/>
-                    <a:p>
-                      <a:pPr algn="ctr"/>
-                      <a:r>
-                        <a:rPr lang="en-US" sz="1600" dirty="0" smtClean="0">
-                          <a:latin typeface="Cambria" panose="02040503050406030204" pitchFamily="18" charset="0"/>
-                        </a:rPr>
-                        <a:t>Index</a:t>
-                      </a:r>
-                      <a:endParaRPr lang="en-US" sz="1600" dirty="0">
-                        <a:latin typeface="Cambria" panose="02040503050406030204" pitchFamily="18" charset="0"/>
-                      </a:endParaRPr>
-                    </a:p>
-                  </a:txBody>
-                  <a:tcPr/>
-                </a:tc>
-                <a:tc>
-                  <a:txBody>
-                    <a:bodyPr/>
-                    <a:lstStyle/>
-                    <a:p>
-                      <a:pPr algn="ctr"/>
-                      <a:r>
-                        <a:rPr lang="en-US" dirty="0" smtClean="0">
-                          <a:latin typeface="Cambria" panose="02040503050406030204" pitchFamily="18" charset="0"/>
-                        </a:rPr>
-                        <a:t>Sample value</a:t>
-                      </a:r>
-                      <a:endParaRPr lang="en-US" dirty="0">
-                        <a:latin typeface="Cambria" panose="02040503050406030204" pitchFamily="18" charset="0"/>
-                      </a:endParaRPr>
-                    </a:p>
-                  </a:txBody>
-                  <a:tcPr/>
-                </a:tc>
-              </a:tr>
-              <a:tr h="360336">
-                <a:tc>
-                  <a:txBody>
-                    <a:bodyPr/>
-                    <a:lstStyle/>
-                    <a:p>
-                      <a:pPr algn="ctr"/>
-                      <a:r>
-                        <a:rPr lang="en-US" smtClean="0">
-                          <a:latin typeface="Cambria" panose="02040503050406030204" pitchFamily="18" charset="0"/>
-                        </a:rPr>
-                        <a:t>0</a:t>
-                      </a:r>
-                      <a:endParaRPr lang="en-US" dirty="0">
-                        <a:latin typeface="Cambria" panose="02040503050406030204" pitchFamily="18" charset="0"/>
-                      </a:endParaRPr>
-                    </a:p>
-                  </a:txBody>
-                  <a:tcPr/>
-                </a:tc>
-                <a:tc>
-                  <a:txBody>
-                    <a:bodyPr/>
-                    <a:lstStyle/>
-                    <a:p>
-                      <a:pPr algn="ctr"/>
-                      <a:r>
-                        <a:rPr lang="en-US" smtClean="0">
-                          <a:latin typeface="Cambria" panose="02040503050406030204" pitchFamily="18" charset="0"/>
-                        </a:rPr>
-                        <a:t>1</a:t>
-                      </a:r>
-                      <a:endParaRPr lang="en-US" dirty="0">
-                        <a:latin typeface="Cambria" panose="02040503050406030204" pitchFamily="18" charset="0"/>
-                      </a:endParaRPr>
-                    </a:p>
-                  </a:txBody>
-                  <a:tcPr/>
-                </a:tc>
-              </a:tr>
-              <a:tr h="360336">
-                <a:tc>
-                  <a:txBody>
-                    <a:bodyPr/>
-                    <a:lstStyle/>
-                    <a:p>
-                      <a:pPr algn="ctr"/>
-                      <a:r>
-                        <a:rPr lang="en-US" smtClean="0">
-                          <a:latin typeface="Cambria" panose="02040503050406030204" pitchFamily="18" charset="0"/>
-                        </a:rPr>
-                        <a:t>1</a:t>
-                      </a:r>
-                      <a:endParaRPr lang="en-US" dirty="0">
-                        <a:latin typeface="Cambria" panose="02040503050406030204" pitchFamily="18" charset="0"/>
-                      </a:endParaRPr>
-                    </a:p>
-                  </a:txBody>
-                  <a:tcPr/>
-                </a:tc>
-                <a:tc>
-                  <a:txBody>
-                    <a:bodyPr/>
-                    <a:lstStyle/>
-                    <a:p>
-                      <a:pPr algn="ctr"/>
-                      <a:r>
-                        <a:rPr lang="en-US" smtClean="0">
-                          <a:latin typeface="Cambria" panose="02040503050406030204" pitchFamily="18" charset="0"/>
-                        </a:rPr>
-                        <a:t>8999</a:t>
-                      </a:r>
-                      <a:endParaRPr lang="en-US" dirty="0">
-                        <a:latin typeface="Cambria" panose="02040503050406030204" pitchFamily="18" charset="0"/>
-                      </a:endParaRPr>
-                    </a:p>
-                  </a:txBody>
-                  <a:tcPr/>
-                </a:tc>
-              </a:tr>
-              <a:tr h="360336">
-                <a:tc>
-                  <a:txBody>
-                    <a:bodyPr/>
-                    <a:lstStyle/>
-                    <a:p>
-                      <a:pPr algn="ctr"/>
-                      <a:r>
-                        <a:rPr lang="en-US" smtClean="0">
-                          <a:latin typeface="Cambria" panose="02040503050406030204" pitchFamily="18" charset="0"/>
-                        </a:rPr>
-                        <a:t>2</a:t>
-                      </a:r>
-                      <a:endParaRPr lang="en-US" dirty="0">
-                        <a:latin typeface="Cambria" panose="02040503050406030204" pitchFamily="18" charset="0"/>
-                      </a:endParaRPr>
-                    </a:p>
-                  </a:txBody>
-                  <a:tcPr/>
-                </a:tc>
-                <a:tc>
-                  <a:txBody>
-                    <a:bodyPr/>
-                    <a:lstStyle/>
-                    <a:p>
-                      <a:pPr algn="ctr"/>
-                      <a:r>
-                        <a:rPr lang="en-US" dirty="0" smtClean="0">
-                          <a:latin typeface="Cambria" panose="02040503050406030204" pitchFamily="18" charset="0"/>
-                        </a:rPr>
-                        <a:t>8994</a:t>
-                      </a:r>
-                      <a:endParaRPr lang="en-US" dirty="0">
-                        <a:latin typeface="Cambria" panose="02040503050406030204" pitchFamily="18" charset="0"/>
-                      </a:endParaRPr>
-                    </a:p>
-                  </a:txBody>
-                  <a:tcPr/>
-                </a:tc>
-              </a:tr>
-              <a:tr h="1050981">
-                <a:tc>
-                  <a:txBody>
-                    <a:bodyPr/>
-                    <a:lstStyle/>
-                    <a:p>
-                      <a:pPr algn="ctr"/>
-                      <a:r>
-                        <a:rPr lang="en-US" smtClean="0">
-                          <a:latin typeface="Cambria" panose="02040503050406030204" pitchFamily="18" charset="0"/>
-                        </a:rPr>
-                        <a:t>3</a:t>
-                      </a:r>
-                      <a:endParaRPr lang="en-US" dirty="0">
-                        <a:latin typeface="Cambria" panose="02040503050406030204" pitchFamily="18" charset="0"/>
-                      </a:endParaRPr>
-                    </a:p>
-                  </a:txBody>
-                  <a:tcPr/>
-                </a:tc>
-                <a:tc>
-                  <a:txBody>
-                    <a:bodyPr/>
-                    <a:lstStyle/>
-                    <a:p>
-                      <a:pPr marL="0" marR="0" indent="0" algn="ctr" defTabSz="914400" rtl="0" eaLnBrk="1" fontAlgn="auto" latinLnBrk="0" hangingPunct="1">
-                        <a:lnSpc>
-                          <a:spcPct val="100000"/>
-                        </a:lnSpc>
-                        <a:spcBef>
-                          <a:spcPts val="0"/>
-                        </a:spcBef>
-                        <a:spcAft>
-                          <a:spcPts val="0"/>
-                        </a:spcAft>
-                        <a:buClrTx/>
-                        <a:buSzTx/>
-                        <a:buFontTx/>
-                        <a:buNone/>
-                        <a:tabLst/>
-                        <a:defRPr/>
-                      </a:pPr>
-                      <a:r>
-                        <a:rPr lang="en-US" sz="1600" b="0" i="0" kern="1200" dirty="0" smtClean="0">
-                          <a:solidFill>
-                            <a:schemeClr val="dk1"/>
-                          </a:solidFill>
-                          <a:effectLst/>
-                          <a:latin typeface="Cambria" panose="02040503050406030204" pitchFamily="18" charset="0"/>
-                          <a:ea typeface="+mn-ea"/>
-                          <a:cs typeface="+mn-cs"/>
-                        </a:rPr>
-                        <a:t>106.70589000000001,10.776800000000001 106.70627,10.775810000000002 106.70623,10.77579 106.70617000000001,10.77576 ...</a:t>
-                      </a:r>
-                      <a:endParaRPr lang="en-US" sz="1600" dirty="0" smtClean="0">
-                        <a:latin typeface="Cambria" panose="02040503050406030204" pitchFamily="18" charset="0"/>
-                      </a:endParaRPr>
-                    </a:p>
-                  </a:txBody>
-                  <a:tcPr/>
-                </a:tc>
-              </a:tr>
-              <a:tr h="360336">
-                <a:tc>
-                  <a:txBody>
-                    <a:bodyPr/>
-                    <a:lstStyle/>
-                    <a:p>
-                      <a:pPr algn="ctr"/>
-                      <a:r>
-                        <a:rPr lang="en-US" smtClean="0">
-                          <a:latin typeface="Cambria" panose="02040503050406030204" pitchFamily="18" charset="0"/>
-                        </a:rPr>
-                        <a:t>4</a:t>
-                      </a:r>
-                      <a:endParaRPr lang="en-US" dirty="0">
-                        <a:latin typeface="Cambria" panose="02040503050406030204" pitchFamily="18" charset="0"/>
-                      </a:endParaRPr>
-                    </a:p>
-                  </a:txBody>
-                  <a:tcPr/>
-                </a:tc>
-                <a:tc>
-                  <a:txBody>
-                    <a:bodyPr/>
-                    <a:lstStyle/>
-                    <a:p>
-                      <a:pPr algn="ctr"/>
-                      <a:r>
-                        <a:rPr lang="en-US" smtClean="0">
-                          <a:latin typeface="Cambria" panose="02040503050406030204" pitchFamily="18" charset="0"/>
-                        </a:rPr>
-                        <a:t>True</a:t>
-                      </a:r>
-                      <a:endParaRPr lang="en-US" dirty="0">
-                        <a:latin typeface="Cambria" panose="02040503050406030204" pitchFamily="18" charset="0"/>
-                      </a:endParaRPr>
-                    </a:p>
-                  </a:txBody>
-                  <a:tcPr/>
-                </a:tc>
-              </a:tr>
-              <a:tr h="360336">
-                <a:tc>
-                  <a:txBody>
-                    <a:bodyPr/>
-                    <a:lstStyle/>
-                    <a:p>
-                      <a:pPr algn="ctr"/>
-                      <a:r>
-                        <a:rPr lang="en-US" smtClean="0">
-                          <a:latin typeface="Cambria" panose="02040503050406030204" pitchFamily="18" charset="0"/>
-                        </a:rPr>
-                        <a:t>5</a:t>
-                      </a:r>
-                      <a:endParaRPr lang="en-US" dirty="0">
-                        <a:latin typeface="Cambria" panose="02040503050406030204" pitchFamily="18" charset="0"/>
-                      </a:endParaRPr>
-                    </a:p>
-                  </a:txBody>
-                  <a:tcPr/>
-                </a:tc>
-                <a:tc>
-                  <a:txBody>
-                    <a:bodyPr/>
-                    <a:lstStyle/>
-                    <a:p>
-                      <a:pPr algn="ctr"/>
-                      <a:r>
-                        <a:rPr lang="en-US" sz="1800" b="0" i="0" kern="1200" smtClean="0">
-                          <a:solidFill>
-                            <a:schemeClr val="dk1"/>
-                          </a:solidFill>
-                          <a:effectLst/>
-                          <a:latin typeface="Cambria" panose="02040503050406030204" pitchFamily="18" charset="0"/>
-                          <a:ea typeface="+mn-ea"/>
-                          <a:cs typeface="+mn-cs"/>
-                        </a:rPr>
-                        <a:t>1</a:t>
-                      </a:r>
-                      <a:endParaRPr lang="en-US" dirty="0">
-                        <a:latin typeface="Cambria" panose="02040503050406030204" pitchFamily="18" charset="0"/>
-                      </a:endParaRPr>
-                    </a:p>
-                  </a:txBody>
-                  <a:tcPr/>
-                </a:tc>
-              </a:tr>
-              <a:tr h="360336">
-                <a:tc>
-                  <a:txBody>
-                    <a:bodyPr/>
-                    <a:lstStyle/>
-                    <a:p>
-                      <a:pPr algn="ctr"/>
-                      <a:r>
-                        <a:rPr lang="en-US" smtClean="0">
-                          <a:latin typeface="Cambria" panose="02040503050406030204" pitchFamily="18" charset="0"/>
-                        </a:rPr>
-                        <a:t>6</a:t>
-                      </a:r>
-                      <a:endParaRPr lang="en-US" dirty="0">
-                        <a:latin typeface="Cambria" panose="02040503050406030204" pitchFamily="18" charset="0"/>
-                      </a:endParaRPr>
-                    </a:p>
-                  </a:txBody>
-                  <a:tcPr/>
-                </a:tc>
-                <a:tc>
-                  <a:txBody>
-                    <a:bodyPr/>
-                    <a:lstStyle/>
-                    <a:p>
-                      <a:pPr algn="ctr"/>
-                      <a:r>
-                        <a:rPr lang="en-US" sz="1800" b="0" i="0" kern="1200" smtClean="0">
-                          <a:solidFill>
-                            <a:schemeClr val="dk1"/>
-                          </a:solidFill>
-                          <a:effectLst/>
-                          <a:latin typeface="Cambria" panose="02040503050406030204" pitchFamily="18" charset="0"/>
-                          <a:ea typeface="+mn-ea"/>
-                          <a:cs typeface="+mn-cs"/>
-                        </a:rPr>
-                        <a:t>468.747807122203</a:t>
-                      </a:r>
-                      <a:endParaRPr lang="en-US" dirty="0">
-                        <a:latin typeface="Cambria" panose="02040503050406030204" pitchFamily="18" charset="0"/>
-                      </a:endParaRPr>
-                    </a:p>
-                  </a:txBody>
-                  <a:tcPr/>
-                </a:tc>
-              </a:tr>
-              <a:tr h="360336">
-                <a:tc>
-                  <a:txBody>
-                    <a:bodyPr/>
-                    <a:lstStyle/>
-                    <a:p>
-                      <a:pPr algn="ctr"/>
-                      <a:r>
-                        <a:rPr lang="en-US" smtClean="0">
-                          <a:latin typeface="Cambria" panose="02040503050406030204" pitchFamily="18" charset="0"/>
-                        </a:rPr>
-                        <a:t>7</a:t>
-                      </a:r>
-                      <a:endParaRPr lang="en-US" dirty="0">
-                        <a:latin typeface="Cambria" panose="02040503050406030204" pitchFamily="18" charset="0"/>
-                      </a:endParaRPr>
-                    </a:p>
-                  </a:txBody>
-                  <a:tcPr/>
-                </a:tc>
-                <a:tc>
-                  <a:txBody>
-                    <a:bodyPr/>
-                    <a:lstStyle/>
-                    <a:p>
-                      <a:pPr algn="ctr"/>
-                      <a:r>
-                        <a:rPr lang="vi-VN" sz="1800" b="0" i="0" kern="1200" smtClean="0">
-                          <a:solidFill>
-                            <a:schemeClr val="dk1"/>
-                          </a:solidFill>
-                          <a:effectLst/>
-                          <a:latin typeface="Cambria" panose="02040503050406030204" pitchFamily="18" charset="0"/>
-                          <a:ea typeface="+mn-ea"/>
-                          <a:cs typeface="+mn-cs"/>
-                        </a:rPr>
-                        <a:t>Công Trường Mê Linh</a:t>
-                      </a:r>
-                      <a:endParaRPr lang="en-US" dirty="0">
-                        <a:latin typeface="Cambria" panose="02040503050406030204" pitchFamily="18" charset="0"/>
-                      </a:endParaRPr>
-                    </a:p>
-                  </a:txBody>
-                  <a:tcPr/>
-                </a:tc>
-              </a:tr>
-              <a:tr h="360336">
-                <a:tc>
-                  <a:txBody>
-                    <a:bodyPr/>
-                    <a:lstStyle/>
-                    <a:p>
-                      <a:pPr algn="ctr"/>
-                      <a:r>
-                        <a:rPr lang="en-US" smtClean="0">
-                          <a:latin typeface="Cambria" panose="02040503050406030204" pitchFamily="18" charset="0"/>
-                        </a:rPr>
-                        <a:t>8</a:t>
-                      </a:r>
-                      <a:endParaRPr lang="en-US" dirty="0">
-                        <a:latin typeface="Cambria" panose="02040503050406030204" pitchFamily="18" charset="0"/>
-                      </a:endParaRPr>
-                    </a:p>
-                  </a:txBody>
-                  <a:tcPr/>
-                </a:tc>
-                <a:tc>
-                  <a:txBody>
-                    <a:bodyPr/>
-                    <a:lstStyle/>
-                    <a:p>
-                      <a:pPr algn="ctr"/>
-                      <a:r>
-                        <a:rPr lang="en-US" sz="1800" b="0" i="0" kern="1200" smtClean="0">
-                          <a:solidFill>
-                            <a:schemeClr val="dk1"/>
-                          </a:solidFill>
-                          <a:effectLst/>
-                          <a:latin typeface="Cambria" panose="02040503050406030204" pitchFamily="18" charset="0"/>
-                          <a:ea typeface="+mn-ea"/>
-                          <a:cs typeface="+mn-cs"/>
-                        </a:rPr>
-                        <a:t>106.705856990563</a:t>
-                      </a:r>
-                      <a:endParaRPr lang="en-US" dirty="0">
-                        <a:latin typeface="Cambria" panose="02040503050406030204" pitchFamily="18" charset="0"/>
-                      </a:endParaRPr>
-                    </a:p>
-                  </a:txBody>
-                  <a:tcPr/>
-                </a:tc>
-              </a:tr>
-              <a:tr h="360336">
-                <a:tc>
-                  <a:txBody>
-                    <a:bodyPr/>
-                    <a:lstStyle/>
-                    <a:p>
-                      <a:pPr algn="ctr"/>
-                      <a:r>
-                        <a:rPr lang="en-US" smtClean="0">
-                          <a:latin typeface="Cambria" panose="02040503050406030204" pitchFamily="18" charset="0"/>
-                        </a:rPr>
-                        <a:t>9</a:t>
-                      </a:r>
-                      <a:endParaRPr lang="en-US" dirty="0">
-                        <a:latin typeface="Cambria" panose="02040503050406030204" pitchFamily="18" charset="0"/>
-                      </a:endParaRPr>
-                    </a:p>
-                  </a:txBody>
-                  <a:tcPr/>
-                </a:tc>
-                <a:tc>
-                  <a:txBody>
-                    <a:bodyPr/>
-                    <a:lstStyle/>
-                    <a:p>
-                      <a:pPr algn="ctr"/>
-                      <a:r>
-                        <a:rPr lang="en-US" sz="1800" b="0" i="0" kern="1200" smtClean="0">
-                          <a:solidFill>
-                            <a:schemeClr val="dk1"/>
-                          </a:solidFill>
-                          <a:effectLst/>
-                          <a:latin typeface="Cambria" panose="02040503050406030204" pitchFamily="18" charset="0"/>
-                          <a:ea typeface="+mn-ea"/>
-                          <a:cs typeface="+mn-cs"/>
-                        </a:rPr>
-                        <a:t>10.7767894851893</a:t>
-                      </a:r>
-                      <a:endParaRPr lang="en-US" dirty="0">
-                        <a:latin typeface="Cambria" panose="02040503050406030204" pitchFamily="18" charset="0"/>
-                      </a:endParaRPr>
-                    </a:p>
-                  </a:txBody>
-                  <a:tcPr/>
-                </a:tc>
-              </a:tr>
-              <a:tr h="360336">
-                <a:tc>
-                  <a:txBody>
-                    <a:bodyPr/>
-                    <a:lstStyle/>
-                    <a:p>
-                      <a:pPr algn="ctr"/>
-                      <a:r>
-                        <a:rPr lang="en-US" smtClean="0">
-                          <a:latin typeface="Cambria" panose="02040503050406030204" pitchFamily="18" charset="0"/>
-                        </a:rPr>
-                        <a:t>10</a:t>
-                      </a:r>
-                      <a:endParaRPr lang="en-US" dirty="0">
-                        <a:latin typeface="Cambria" panose="02040503050406030204" pitchFamily="18" charset="0"/>
-                      </a:endParaRPr>
-                    </a:p>
-                  </a:txBody>
-                  <a:tcPr/>
-                </a:tc>
-                <a:tc>
-                  <a:txBody>
-                    <a:bodyPr/>
-                    <a:lstStyle/>
-                    <a:p>
-                      <a:pPr algn="ctr"/>
-                      <a:r>
-                        <a:rPr lang="en-US" sz="1800" b="0" i="0" kern="1200" smtClean="0">
-                          <a:solidFill>
-                            <a:schemeClr val="dk1"/>
-                          </a:solidFill>
-                          <a:effectLst/>
-                          <a:latin typeface="Cambria" panose="02040503050406030204" pitchFamily="18" charset="0"/>
-                          <a:ea typeface="+mn-ea"/>
-                          <a:cs typeface="+mn-cs"/>
-                        </a:rPr>
-                        <a:t>01</a:t>
-                      </a:r>
-                      <a:endParaRPr lang="en-US" dirty="0">
-                        <a:latin typeface="Cambria" panose="02040503050406030204" pitchFamily="18" charset="0"/>
-                      </a:endParaRPr>
-                    </a:p>
-                  </a:txBody>
-                  <a:tcPr/>
-                </a:tc>
-              </a:tr>
-              <a:tr h="360336">
-                <a:tc>
-                  <a:txBody>
-                    <a:bodyPr/>
-                    <a:lstStyle/>
-                    <a:p>
-                      <a:pPr algn="ctr"/>
-                      <a:r>
-                        <a:rPr lang="en-US" smtClean="0">
-                          <a:latin typeface="Cambria" panose="02040503050406030204" pitchFamily="18" charset="0"/>
-                        </a:rPr>
-                        <a:t>11</a:t>
-                      </a:r>
-                      <a:endParaRPr lang="en-US" dirty="0">
-                        <a:latin typeface="Cambria" panose="02040503050406030204" pitchFamily="18" charset="0"/>
-                      </a:endParaRPr>
-                    </a:p>
-                  </a:txBody>
-                  <a:tcPr/>
-                </a:tc>
-                <a:tc>
-                  <a:txBody>
-                    <a:bodyPr/>
-                    <a:lstStyle/>
-                    <a:p>
-                      <a:pPr algn="ctr"/>
-                      <a:r>
-                        <a:rPr lang="en-US" sz="1800" b="1" i="0" kern="1200" dirty="0" err="1" smtClean="0">
-                          <a:solidFill>
-                            <a:srgbClr val="FF0000"/>
-                          </a:solidFill>
-                          <a:effectLst/>
-                          <a:latin typeface="Cambria" panose="02040503050406030204" pitchFamily="18" charset="0"/>
-                          <a:ea typeface="+mn-ea"/>
-                          <a:cs typeface="+mn-cs"/>
-                        </a:rPr>
-                        <a:t>Bến</a:t>
-                      </a:r>
-                      <a:r>
-                        <a:rPr lang="en-US" sz="1800" b="1" i="0" kern="1200" dirty="0" smtClean="0">
-                          <a:solidFill>
-                            <a:srgbClr val="FF0000"/>
-                          </a:solidFill>
-                          <a:effectLst/>
-                          <a:latin typeface="Cambria" panose="02040503050406030204" pitchFamily="18" charset="0"/>
-                          <a:ea typeface="+mn-ea"/>
-                          <a:cs typeface="+mn-cs"/>
-                        </a:rPr>
-                        <a:t> </a:t>
-                      </a:r>
-                      <a:r>
-                        <a:rPr lang="en-US" sz="1800" b="1" i="0" kern="1200" dirty="0" err="1" smtClean="0">
-                          <a:solidFill>
-                            <a:srgbClr val="FF0000"/>
-                          </a:solidFill>
-                          <a:effectLst/>
-                          <a:latin typeface="Cambria" panose="02040503050406030204" pitchFamily="18" charset="0"/>
-                          <a:ea typeface="+mn-ea"/>
-                          <a:cs typeface="+mn-cs"/>
-                        </a:rPr>
-                        <a:t>Thành</a:t>
-                      </a:r>
-                      <a:r>
-                        <a:rPr lang="en-US" sz="1800" b="1" i="0" kern="1200" dirty="0" smtClean="0">
-                          <a:solidFill>
-                            <a:srgbClr val="FF0000"/>
-                          </a:solidFill>
-                          <a:effectLst/>
-                          <a:latin typeface="Cambria" panose="02040503050406030204" pitchFamily="18" charset="0"/>
-                          <a:ea typeface="+mn-ea"/>
-                          <a:cs typeface="+mn-cs"/>
-                        </a:rPr>
-                        <a:t>- BX </a:t>
-                      </a:r>
-                      <a:r>
-                        <a:rPr lang="en-US" sz="1800" b="1" i="0" kern="1200" dirty="0" err="1" smtClean="0">
-                          <a:solidFill>
-                            <a:srgbClr val="FF0000"/>
-                          </a:solidFill>
-                          <a:effectLst/>
-                          <a:latin typeface="Cambria" panose="02040503050406030204" pitchFamily="18" charset="0"/>
-                          <a:ea typeface="+mn-ea"/>
-                          <a:cs typeface="+mn-cs"/>
-                        </a:rPr>
-                        <a:t>Chợ</a:t>
-                      </a:r>
-                      <a:r>
-                        <a:rPr lang="en-US" sz="1800" b="1" i="0" kern="1200" dirty="0" smtClean="0">
-                          <a:solidFill>
-                            <a:srgbClr val="FF0000"/>
-                          </a:solidFill>
-                          <a:effectLst/>
-                          <a:latin typeface="Cambria" panose="02040503050406030204" pitchFamily="18" charset="0"/>
-                          <a:ea typeface="+mn-ea"/>
-                          <a:cs typeface="+mn-cs"/>
-                        </a:rPr>
-                        <a:t> </a:t>
-                      </a:r>
-                      <a:r>
-                        <a:rPr lang="en-US" sz="1800" b="1" i="0" kern="1200" dirty="0" err="1" smtClean="0">
-                          <a:solidFill>
-                            <a:srgbClr val="FF0000"/>
-                          </a:solidFill>
-                          <a:effectLst/>
-                          <a:latin typeface="Cambria" panose="02040503050406030204" pitchFamily="18" charset="0"/>
-                          <a:ea typeface="+mn-ea"/>
-                          <a:cs typeface="+mn-cs"/>
-                        </a:rPr>
-                        <a:t>Lớn</a:t>
-                      </a:r>
-                      <a:endParaRPr lang="en-US" b="1" dirty="0">
-                        <a:solidFill>
-                          <a:srgbClr val="FF0000"/>
-                        </a:solidFill>
-                        <a:latin typeface="Cambria" panose="02040503050406030204" pitchFamily="18" charset="0"/>
-                      </a:endParaRPr>
-                    </a:p>
-                  </a:txBody>
-                  <a:tcPr/>
-                </a:tc>
-              </a:tr>
-              <a:tr h="360336">
-                <a:tc>
-                  <a:txBody>
-                    <a:bodyPr/>
-                    <a:lstStyle/>
-                    <a:p>
-                      <a:pPr algn="ctr"/>
-                      <a:r>
-                        <a:rPr lang="en-US" smtClean="0">
-                          <a:latin typeface="Cambria" panose="02040503050406030204" pitchFamily="18" charset="0"/>
-                        </a:rPr>
-                        <a:t>12</a:t>
-                      </a:r>
-                      <a:endParaRPr lang="en-US" dirty="0">
-                        <a:latin typeface="Cambria" panose="02040503050406030204" pitchFamily="18" charset="0"/>
-                      </a:endParaRPr>
-                    </a:p>
-                  </a:txBody>
-                  <a:tcPr/>
-                </a:tc>
-                <a:tc>
-                  <a:txBody>
-                    <a:bodyPr/>
-                    <a:lstStyle/>
-                    <a:p>
-                      <a:pPr algn="ctr"/>
-                      <a:r>
-                        <a:rPr lang="vi-VN" sz="1800" b="0" i="0" kern="1200" smtClean="0">
-                          <a:solidFill>
-                            <a:schemeClr val="dk1"/>
-                          </a:solidFill>
-                          <a:effectLst/>
-                          <a:latin typeface="Cambria" panose="02040503050406030204" pitchFamily="18" charset="0"/>
-                          <a:ea typeface="+mn-ea"/>
-                          <a:cs typeface="+mn-cs"/>
-                        </a:rPr>
-                        <a:t>Công trường Mê Linh, Thi Sách, Quận 1</a:t>
-                      </a:r>
-                      <a:endParaRPr lang="en-US" dirty="0">
-                        <a:latin typeface="Cambria" panose="02040503050406030204" pitchFamily="18" charset="0"/>
-                      </a:endParaRPr>
-                    </a:p>
-                  </a:txBody>
-                  <a:tcPr/>
-                </a:tc>
-              </a:tr>
-              <a:tr h="360336">
-                <a:tc>
-                  <a:txBody>
-                    <a:bodyPr/>
-                    <a:lstStyle/>
-                    <a:p>
-                      <a:pPr algn="ctr"/>
-                      <a:r>
-                        <a:rPr lang="en-US" smtClean="0">
-                          <a:latin typeface="Cambria" panose="02040503050406030204" pitchFamily="18" charset="0"/>
-                        </a:rPr>
-                        <a:t>13</a:t>
-                      </a:r>
-                      <a:endParaRPr lang="en-US" dirty="0">
-                        <a:latin typeface="Cambria" panose="02040503050406030204" pitchFamily="18" charset="0"/>
-                      </a:endParaRPr>
-                    </a:p>
-                  </a:txBody>
-                  <a:tcPr/>
-                </a:tc>
-                <a:tc>
-                  <a:txBody>
-                    <a:bodyPr/>
-                    <a:lstStyle/>
-                    <a:p>
-                      <a:pPr algn="ctr"/>
-                      <a:r>
-                        <a:rPr lang="en-US" sz="1800" b="0" i="0" kern="1200" dirty="0" smtClean="0">
-                          <a:solidFill>
-                            <a:schemeClr val="dk1"/>
-                          </a:solidFill>
-                          <a:effectLst/>
-                          <a:latin typeface="Cambria" panose="02040503050406030204" pitchFamily="18" charset="0"/>
-                          <a:ea typeface="+mn-ea"/>
-                          <a:cs typeface="+mn-cs"/>
-                        </a:rPr>
-                        <a:t>BX06</a:t>
-                      </a:r>
-                      <a:endParaRPr lang="en-US" dirty="0">
-                        <a:latin typeface="Cambria" panose="02040503050406030204" pitchFamily="18" charset="0"/>
-                      </a:endParaRPr>
-                    </a:p>
-                  </a:txBody>
-                  <a:tcPr/>
-                </a:tc>
-              </a:tr>
-            </a:tbl>
-          </a:graphicData>
-        </a:graphic>
-      </p:graphicFrame>
-      <p:sp>
-        <p:nvSpPr>
-          <p:cNvPr id="5" name="Rectangle 4"/>
-          <p:cNvSpPr/>
-          <p:nvPr/>
-        </p:nvSpPr>
-        <p:spPr>
-          <a:xfrm>
-            <a:off x="617220" y="6344920"/>
-            <a:ext cx="7490460" cy="369332"/>
-          </a:xfrm>
-          <a:prstGeom prst="rect">
-            <a:avLst/>
-          </a:prstGeom>
-        </p:spPr>
-        <p:txBody>
-          <a:bodyPr wrap="square">
-            <a:spAutoFit/>
-          </a:bodyPr>
-          <a:lstStyle/>
-          <a:p>
-            <a:r>
-              <a:rPr lang="en-US" dirty="0" smtClean="0"/>
-              <a:t>http://mapbus.ebms.vn/ajax.aspx?action=listRouteStations&amp;</a:t>
-            </a:r>
-            <a:r>
-              <a:rPr lang="en-US" dirty="0" smtClean="0">
-                <a:solidFill>
-                  <a:srgbClr val="FF0000"/>
-                </a:solidFill>
-              </a:rPr>
-              <a:t>rid=1</a:t>
-            </a:r>
-            <a:r>
-              <a:rPr lang="en-US" dirty="0" smtClean="0"/>
-              <a:t>&amp;</a:t>
-            </a:r>
-            <a:r>
-              <a:rPr lang="en-US" dirty="0" smtClean="0">
-                <a:solidFill>
-                  <a:srgbClr val="FF0000"/>
-                </a:solidFill>
-              </a:rPr>
-              <a:t>isgo=true</a:t>
-            </a:r>
-            <a:endParaRPr lang="en-US" dirty="0">
-              <a:solidFill>
-                <a:srgbClr val="FF0000"/>
-              </a:solidFill>
-            </a:endParaRPr>
-          </a:p>
-        </p:txBody>
-      </p:sp>
-      <p:graphicFrame>
-        <p:nvGraphicFramePr>
-          <p:cNvPr id="6" name="Table 5"/>
-          <p:cNvGraphicFramePr>
-            <a:graphicFrameLocks noGrp="1"/>
-          </p:cNvGraphicFramePr>
-          <p:nvPr>
-            <p:extLst>
-              <p:ext uri="{D42A27DB-BD31-4B8C-83A1-F6EECF244321}">
-                <p14:modId xmlns:p14="http://schemas.microsoft.com/office/powerpoint/2010/main" val="1884562370"/>
-              </p:ext>
-            </p:extLst>
-          </p:nvPr>
-        </p:nvGraphicFramePr>
-        <p:xfrm>
-          <a:off x="6694205" y="2349666"/>
-          <a:ext cx="1749039" cy="1487396"/>
-        </p:xfrm>
-        <a:graphic>
-          <a:graphicData uri="http://schemas.openxmlformats.org/drawingml/2006/table">
-            <a:tbl>
-              <a:tblPr firstRow="1" bandRow="1">
-                <a:tableStyleId>{21E4AEA4-8DFA-4A89-87EB-49C32662AFE0}</a:tableStyleId>
-              </a:tblPr>
-              <a:tblGrid>
-                <a:gridCol w="1749039"/>
-              </a:tblGrid>
-              <a:tr h="371849">
-                <a:tc>
-                  <a:txBody>
-                    <a:bodyPr/>
-                    <a:lstStyle/>
-                    <a:p>
-                      <a:pPr algn="ctr"/>
-                      <a:r>
-                        <a:rPr lang="en-US" dirty="0" smtClean="0"/>
-                        <a:t>Route</a:t>
-                      </a:r>
-                      <a:endParaRPr lang="en-US" dirty="0"/>
-                    </a:p>
-                  </a:txBody>
-                  <a:tcPr/>
-                </a:tc>
-              </a:tr>
-              <a:tr h="371849">
-                <a:tc>
-                  <a:txBody>
-                    <a:bodyPr/>
-                    <a:lstStyle/>
-                    <a:p>
-                      <a:r>
-                        <a:rPr lang="en-US" dirty="0" err="1" smtClean="0"/>
-                        <a:t>RouteType</a:t>
-                      </a:r>
-                      <a:endParaRPr lang="en-US" dirty="0"/>
-                    </a:p>
-                  </a:txBody>
-                  <a:tcPr/>
-                </a:tc>
-              </a:tr>
-              <a:tr h="371849">
-                <a:tc>
-                  <a:txBody>
-                    <a:bodyPr/>
-                    <a:lstStyle/>
-                    <a:p>
-                      <a:r>
-                        <a:rPr lang="en-US" dirty="0" err="1" smtClean="0"/>
-                        <a:t>RouteNo</a:t>
-                      </a:r>
-                      <a:endParaRPr lang="en-US" dirty="0"/>
-                    </a:p>
-                  </a:txBody>
-                  <a:tcPr/>
-                </a:tc>
-              </a:tr>
-              <a:tr h="371849">
-                <a:tc>
-                  <a:txBody>
-                    <a:bodyPr/>
-                    <a:lstStyle/>
-                    <a:p>
-                      <a:r>
-                        <a:rPr lang="en-US" dirty="0" err="1" smtClean="0"/>
-                        <a:t>RouteName</a:t>
-                      </a:r>
-                      <a:endParaRPr lang="en-US" dirty="0"/>
-                    </a:p>
-                  </a:txBody>
-                  <a:tcPr/>
-                </a:tc>
-              </a:tr>
-            </a:tbl>
-          </a:graphicData>
-        </a:graphic>
-      </p:graphicFrame>
-      <p:cxnSp>
-        <p:nvCxnSpPr>
-          <p:cNvPr id="7" name="Straight Arrow Connector 6"/>
-          <p:cNvCxnSpPr/>
-          <p:nvPr/>
-        </p:nvCxnSpPr>
-        <p:spPr>
-          <a:xfrm flipV="1">
-            <a:off x="4480560" y="3640508"/>
-            <a:ext cx="2279163" cy="1774774"/>
-          </a:xfrm>
-          <a:prstGeom prst="straightConnector1">
-            <a:avLst/>
-          </a:prstGeom>
-          <a:ln>
-            <a:tailEnd type="triangle"/>
-          </a:ln>
-        </p:spPr>
-        <p:style>
-          <a:lnRef idx="3">
-            <a:schemeClr val="accent2"/>
-          </a:lnRef>
-          <a:fillRef idx="0">
-            <a:schemeClr val="accent2"/>
-          </a:fillRef>
-          <a:effectRef idx="2">
-            <a:schemeClr val="accent2"/>
-          </a:effectRef>
-          <a:fontRef idx="minor">
-            <a:schemeClr val="tx1"/>
-          </a:fontRef>
-        </p:style>
-      </p:cxnSp>
-      <p:pic>
-        <p:nvPicPr>
-          <p:cNvPr id="9" name="Picture 8"/>
-          <p:cNvPicPr>
-            <a:picLocks noChangeAspect="1"/>
-          </p:cNvPicPr>
-          <p:nvPr/>
-        </p:nvPicPr>
-        <p:blipFill>
-          <a:blip r:embed="rId2">
-            <a:extLst>
-              <a:ext uri="{28A0092B-C50C-407E-A947-70E740481C1C}">
-                <a14:useLocalDpi xmlns:a14="http://schemas.microsoft.com/office/drawing/2010/main" val="0"/>
-              </a:ext>
-            </a:extLst>
-          </a:blip>
-          <a:stretch>
-            <a:fillRect/>
-          </a:stretch>
-        </p:blipFill>
-        <p:spPr>
-          <a:xfrm>
-            <a:off x="86063" y="672289"/>
-            <a:ext cx="6784756" cy="443863"/>
-          </a:xfrm>
-          <a:prstGeom prst="rect">
-            <a:avLst/>
-          </a:prstGeom>
-        </p:spPr>
-      </p:pic>
-      <p:cxnSp>
-        <p:nvCxnSpPr>
-          <p:cNvPr id="11" name="Straight Arrow Connector 10"/>
-          <p:cNvCxnSpPr/>
-          <p:nvPr/>
-        </p:nvCxnSpPr>
-        <p:spPr>
-          <a:xfrm flipH="1" flipV="1">
-            <a:off x="1640793" y="1034041"/>
-            <a:ext cx="1162229" cy="4187439"/>
-          </a:xfrm>
-          <a:prstGeom prst="straightConnector1">
-            <a:avLst/>
-          </a:prstGeom>
-          <a:ln>
-            <a:tailEnd type="triangle"/>
-          </a:ln>
-        </p:spPr>
-        <p:style>
-          <a:lnRef idx="3">
-            <a:schemeClr val="accent2"/>
-          </a:lnRef>
-          <a:fillRef idx="0">
-            <a:schemeClr val="accent2"/>
-          </a:fillRef>
-          <a:effectRef idx="2">
-            <a:schemeClr val="accent2"/>
-          </a:effectRef>
-          <a:fontRef idx="minor">
-            <a:schemeClr val="tx1"/>
-          </a:fontRef>
-        </p:style>
-      </p:cxnSp>
-    </p:spTree>
-    <p:extLst>
-      <p:ext uri="{BB962C8B-B14F-4D97-AF65-F5344CB8AC3E}">
-        <p14:creationId xmlns:p14="http://schemas.microsoft.com/office/powerpoint/2010/main" val="3066861398"/>
-      </p:ext>
-    </p:extLst>
-  </p:cSld>
-  <p:clrMapOvr>
-    <a:masterClrMapping/>
-  </p:clrMapOvr>
-  <p:timing>
-    <p:tnLst>
-      <p:par>
-        <p:cTn id="1" dur="indefinite" restart="never" nodeType="tmRoot"/>
-      </p:par>
-    </p:tnLst>
-  </p:timing>
-</p:sld>
-</file>
-
-<file path=ppt/slides/slide11.xml><?xml version="1.0" encoding="utf-8"?>
 <p:sld xmlns:a="http://schemas.openxmlformats.org/drawingml/2006/main" xmlns:r="http://schemas.openxmlformats.org/officeDocument/2006/relationships" xmlns:p="http://schemas.openxmlformats.org/presentationml/2006/main">
   <p:cSld>
     <p:spTree>
@@ -4194,7 +3176,7 @@
 </p:sld>
 </file>
 
-<file path=ppt/slides/slide12.xml><?xml version="1.0" encoding="utf-8"?>
+<file path=ppt/slides/slide11.xml><?xml version="1.0" encoding="utf-8"?>
 <p:sld xmlns:a="http://schemas.openxmlformats.org/drawingml/2006/main" xmlns:r="http://schemas.openxmlformats.org/officeDocument/2006/relationships" xmlns:p="http://schemas.openxmlformats.org/presentationml/2006/main">
   <p:cSld>
     <p:spTree>
@@ -4248,7 +3230,7 @@
 </p:sld>
 </file>
 
-<file path=ppt/slides/slide13.xml><?xml version="1.0" encoding="utf-8"?>
+<file path=ppt/slides/slide12.xml><?xml version="1.0" encoding="utf-8"?>
 <p:sld xmlns:a="http://schemas.openxmlformats.org/drawingml/2006/main" xmlns:r="http://schemas.openxmlformats.org/officeDocument/2006/relationships" xmlns:p="http://schemas.openxmlformats.org/presentationml/2006/main">
   <p:cSld>
     <p:spTree>
@@ -5203,7 +4185,7 @@
 </p:sld>
 </file>
 
-<file path=ppt/slides/slide14.xml><?xml version="1.0" encoding="utf-8"?>
+<file path=ppt/slides/slide13.xml><?xml version="1.0" encoding="utf-8"?>
 <p:sld xmlns:a="http://schemas.openxmlformats.org/drawingml/2006/main" xmlns:r="http://schemas.openxmlformats.org/officeDocument/2006/relationships" xmlns:p="http://schemas.openxmlformats.org/presentationml/2006/main">
   <p:cSld>
     <p:spTree>
@@ -6174,7 +5156,7 @@
 </p:sld>
 </file>
 
-<file path=ppt/slides/slide15.xml><?xml version="1.0" encoding="utf-8"?>
+<file path=ppt/slides/slide14.xml><?xml version="1.0" encoding="utf-8"?>
 <p:sld xmlns:a="http://schemas.openxmlformats.org/drawingml/2006/main" xmlns:r="http://schemas.openxmlformats.org/officeDocument/2006/relationships" xmlns:p="http://schemas.openxmlformats.org/presentationml/2006/main">
   <p:cSld>
     <p:spTree>
@@ -7161,7 +6143,7 @@
 </p:sld>
 </file>
 
-<file path=ppt/slides/slide16.xml><?xml version="1.0" encoding="utf-8"?>
+<file path=ppt/slides/slide15.xml><?xml version="1.0" encoding="utf-8"?>
 <p:sld xmlns:a="http://schemas.openxmlformats.org/drawingml/2006/main" xmlns:r="http://schemas.openxmlformats.org/officeDocument/2006/relationships" xmlns:p="http://schemas.openxmlformats.org/presentationml/2006/main">
   <p:cSld>
     <p:spTree>
@@ -8164,7 +7146,7 @@
 </p:sld>
 </file>
 
-<file path=ppt/slides/slide17.xml><?xml version="1.0" encoding="utf-8"?>
+<file path=ppt/slides/slide16.xml><?xml version="1.0" encoding="utf-8"?>
 <p:sld xmlns:a="http://schemas.openxmlformats.org/drawingml/2006/main" xmlns:r="http://schemas.openxmlformats.org/officeDocument/2006/relationships" xmlns:p="http://schemas.openxmlformats.org/presentationml/2006/main">
   <p:cSld>
     <p:spTree>
@@ -9183,7 +8165,7 @@
 </p:sld>
 </file>
 
-<file path=ppt/slides/slide18.xml><?xml version="1.0" encoding="utf-8"?>
+<file path=ppt/slides/slide17.xml><?xml version="1.0" encoding="utf-8"?>
 <p:sld xmlns:a="http://schemas.openxmlformats.org/drawingml/2006/main" xmlns:r="http://schemas.openxmlformats.org/officeDocument/2006/relationships" xmlns:p="http://schemas.openxmlformats.org/presentationml/2006/main">
   <p:cSld>
     <p:spTree>
@@ -9276,7 +8258,7 @@
 </p:sld>
 </file>
 
-<file path=ppt/slides/slide19.xml><?xml version="1.0" encoding="utf-8"?>
+<file path=ppt/slides/slide18.xml><?xml version="1.0" encoding="utf-8"?>
 <p:sld xmlns:a="http://schemas.openxmlformats.org/drawingml/2006/main" xmlns:r="http://schemas.openxmlformats.org/officeDocument/2006/relationships" xmlns:p="http://schemas.openxmlformats.org/presentationml/2006/main">
   <p:cSld>
     <p:spTree>
@@ -9336,192 +8318,7 @@
 </p:sld>
 </file>
 
-<file path=ppt/slides/slide2.xml><?xml version="1.0" encoding="utf-8"?>
-<p:sld xmlns:a="http://schemas.openxmlformats.org/drawingml/2006/main" xmlns:r="http://schemas.openxmlformats.org/officeDocument/2006/relationships" xmlns:p="http://schemas.openxmlformats.org/presentationml/2006/main">
-  <p:cSld>
-    <p:spTree>
-      <p:nvGrpSpPr>
-        <p:cNvPr id="1" name=""/>
-        <p:cNvGrpSpPr/>
-        <p:nvPr/>
-      </p:nvGrpSpPr>
-      <p:grpSpPr>
-        <a:xfrm>
-          <a:off x="0" y="0"/>
-          <a:ext cx="0" cy="0"/>
-          <a:chOff x="0" y="0"/>
-          <a:chExt cx="0" cy="0"/>
-        </a:xfrm>
-      </p:grpSpPr>
-      <p:sp>
-        <p:nvSpPr>
-          <p:cNvPr id="7" name="Rectangle 6"/>
-          <p:cNvSpPr/>
-          <p:nvPr/>
-        </p:nvSpPr>
-        <p:spPr>
-          <a:xfrm>
-            <a:off x="612949" y="1256044"/>
-            <a:ext cx="8400422" cy="4541855"/>
-          </a:xfrm>
-          <a:prstGeom prst="rect">
-            <a:avLst/>
-          </a:prstGeom>
-        </p:spPr>
-        <p:style>
-          <a:lnRef idx="2">
-            <a:schemeClr val="dk1"/>
-          </a:lnRef>
-          <a:fillRef idx="1">
-            <a:schemeClr val="lt1"/>
-          </a:fillRef>
-          <a:effectRef idx="0">
-            <a:schemeClr val="dk1"/>
-          </a:effectRef>
-          <a:fontRef idx="minor">
-            <a:schemeClr val="dk1"/>
-          </a:fontRef>
-        </p:style>
-        <p:txBody>
-          <a:bodyPr rtlCol="0" anchor="ctr"/>
-          <a:lstStyle/>
-          <a:p>
-            <a:pPr algn="ctr"/>
-            <a:endParaRPr lang="en-US" dirty="0"/>
-          </a:p>
-        </p:txBody>
-      </p:sp>
-      <p:pic>
-        <p:nvPicPr>
-          <p:cNvPr id="5" name="Picture 4"/>
-          <p:cNvPicPr>
-            <a:picLocks noChangeAspect="1"/>
-          </p:cNvPicPr>
-          <p:nvPr/>
-        </p:nvPicPr>
-        <p:blipFill>
-          <a:blip r:embed="rId2">
-            <a:extLst>
-              <a:ext uri="{28A0092B-C50C-407E-A947-70E740481C1C}">
-                <a14:useLocalDpi xmlns:a14="http://schemas.microsoft.com/office/drawing/2010/main" val="0"/>
-              </a:ext>
-            </a:extLst>
-          </a:blip>
-          <a:stretch>
-            <a:fillRect/>
-          </a:stretch>
-        </p:blipFill>
-        <p:spPr>
-          <a:xfrm>
-            <a:off x="790601" y="1446963"/>
-            <a:ext cx="7943946" cy="3607358"/>
-          </a:xfrm>
-          <a:prstGeom prst="rect">
-            <a:avLst/>
-          </a:prstGeom>
-        </p:spPr>
-      </p:pic>
-      <p:sp>
-        <p:nvSpPr>
-          <p:cNvPr id="8" name="TextBox 7"/>
-          <p:cNvSpPr txBox="1"/>
-          <p:nvPr/>
-        </p:nvSpPr>
-        <p:spPr>
-          <a:xfrm>
-            <a:off x="130628" y="572756"/>
-            <a:ext cx="5114612" cy="584775"/>
-          </a:xfrm>
-          <a:prstGeom prst="rect">
-            <a:avLst/>
-          </a:prstGeom>
-          <a:noFill/>
-        </p:spPr>
-        <p:txBody>
-          <a:bodyPr wrap="square" rtlCol="0">
-            <a:spAutoFit/>
-          </a:bodyPr>
-          <a:lstStyle/>
-          <a:p>
-            <a:r>
-              <a:rPr lang="en-US" sz="3200" dirty="0" smtClean="0">
-                <a:solidFill>
-                  <a:schemeClr val="bg2">
-                    <a:lumMod val="50000"/>
-                  </a:schemeClr>
-                </a:solidFill>
-              </a:rPr>
-              <a:t>BUSES ROUTE INFORMATION</a:t>
-            </a:r>
-            <a:endParaRPr lang="en-US" sz="3200" dirty="0">
-              <a:solidFill>
-                <a:schemeClr val="bg2">
-                  <a:lumMod val="50000"/>
-                </a:schemeClr>
-              </a:solidFill>
-            </a:endParaRPr>
-          </a:p>
-        </p:txBody>
-      </p:sp>
-      <p:sp>
-        <p:nvSpPr>
-          <p:cNvPr id="9" name="TextBox 8"/>
-          <p:cNvSpPr txBox="1"/>
-          <p:nvPr/>
-        </p:nvSpPr>
-        <p:spPr>
-          <a:xfrm>
-            <a:off x="2303343" y="5245240"/>
-            <a:ext cx="4918462" cy="369332"/>
-          </a:xfrm>
-          <a:prstGeom prst="rect">
-            <a:avLst/>
-          </a:prstGeom>
-          <a:noFill/>
-        </p:spPr>
-        <p:txBody>
-          <a:bodyPr wrap="none" rtlCol="0">
-            <a:spAutoFit/>
-          </a:bodyPr>
-          <a:lstStyle/>
-          <a:p>
-            <a:r>
-              <a:rPr lang="en-US" dirty="0" smtClean="0">
-                <a:solidFill>
-                  <a:schemeClr val="accent4"/>
-                </a:solidFill>
-              </a:rPr>
-              <a:t>http://route.buyttphcm.com.vn/routeoftrunk.aspx</a:t>
-            </a:r>
-            <a:endParaRPr lang="en-US" dirty="0">
-              <a:solidFill>
-                <a:schemeClr val="accent4"/>
-              </a:solidFill>
-            </a:endParaRPr>
-          </a:p>
-        </p:txBody>
-      </p:sp>
-    </p:spTree>
-    <p:extLst>
-      <p:ext uri="{BB962C8B-B14F-4D97-AF65-F5344CB8AC3E}">
-        <p14:creationId xmlns:p14="http://schemas.microsoft.com/office/powerpoint/2010/main" val="4262450386"/>
-      </p:ext>
-    </p:extLst>
-  </p:cSld>
-  <p:clrMapOvr>
-    <a:masterClrMapping/>
-  </p:clrMapOvr>
-  <p:timing>
-    <p:tnLst>
-      <p:par>
-        <p:cTn id="1" dur="indefinite" restart="never" nodeType="tmRoot"/>
-      </p:par>
-    </p:tnLst>
-  </p:timing>
-</p:sld>
-</file>
-
-<file path=ppt/slides/slide20.xml><?xml version="1.0" encoding="utf-8"?>
+<file path=ppt/slides/slide19.xml><?xml version="1.0" encoding="utf-8"?>
 <p:sld xmlns:a="http://schemas.openxmlformats.org/drawingml/2006/main" xmlns:r="http://schemas.openxmlformats.org/officeDocument/2006/relationships" xmlns:p="http://schemas.openxmlformats.org/presentationml/2006/main">
   <p:cSld>
     <p:spTree>
@@ -10584,7 +9381,192 @@
 </p:sld>
 </file>
 
-<file path=ppt/slides/slide21.xml><?xml version="1.0" encoding="utf-8"?>
+<file path=ppt/slides/slide2.xml><?xml version="1.0" encoding="utf-8"?>
+<p:sld xmlns:a="http://schemas.openxmlformats.org/drawingml/2006/main" xmlns:r="http://schemas.openxmlformats.org/officeDocument/2006/relationships" xmlns:p="http://schemas.openxmlformats.org/presentationml/2006/main">
+  <p:cSld>
+    <p:spTree>
+      <p:nvGrpSpPr>
+        <p:cNvPr id="1" name=""/>
+        <p:cNvGrpSpPr/>
+        <p:nvPr/>
+      </p:nvGrpSpPr>
+      <p:grpSpPr>
+        <a:xfrm>
+          <a:off x="0" y="0"/>
+          <a:ext cx="0" cy="0"/>
+          <a:chOff x="0" y="0"/>
+          <a:chExt cx="0" cy="0"/>
+        </a:xfrm>
+      </p:grpSpPr>
+      <p:sp>
+        <p:nvSpPr>
+          <p:cNvPr id="7" name="Rectangle 6"/>
+          <p:cNvSpPr/>
+          <p:nvPr/>
+        </p:nvSpPr>
+        <p:spPr>
+          <a:xfrm>
+            <a:off x="612949" y="1256044"/>
+            <a:ext cx="8400422" cy="4541855"/>
+          </a:xfrm>
+          <a:prstGeom prst="rect">
+            <a:avLst/>
+          </a:prstGeom>
+        </p:spPr>
+        <p:style>
+          <a:lnRef idx="2">
+            <a:schemeClr val="dk1"/>
+          </a:lnRef>
+          <a:fillRef idx="1">
+            <a:schemeClr val="lt1"/>
+          </a:fillRef>
+          <a:effectRef idx="0">
+            <a:schemeClr val="dk1"/>
+          </a:effectRef>
+          <a:fontRef idx="minor">
+            <a:schemeClr val="dk1"/>
+          </a:fontRef>
+        </p:style>
+        <p:txBody>
+          <a:bodyPr rtlCol="0" anchor="ctr"/>
+          <a:lstStyle/>
+          <a:p>
+            <a:pPr algn="ctr"/>
+            <a:endParaRPr lang="en-US" dirty="0"/>
+          </a:p>
+        </p:txBody>
+      </p:sp>
+      <p:pic>
+        <p:nvPicPr>
+          <p:cNvPr id="5" name="Picture 4"/>
+          <p:cNvPicPr>
+            <a:picLocks noChangeAspect="1"/>
+          </p:cNvPicPr>
+          <p:nvPr/>
+        </p:nvPicPr>
+        <p:blipFill>
+          <a:blip r:embed="rId2">
+            <a:extLst>
+              <a:ext uri="{28A0092B-C50C-407E-A947-70E740481C1C}">
+                <a14:useLocalDpi xmlns:a14="http://schemas.microsoft.com/office/drawing/2010/main" val="0"/>
+              </a:ext>
+            </a:extLst>
+          </a:blip>
+          <a:stretch>
+            <a:fillRect/>
+          </a:stretch>
+        </p:blipFill>
+        <p:spPr>
+          <a:xfrm>
+            <a:off x="790601" y="1446963"/>
+            <a:ext cx="7943946" cy="3607358"/>
+          </a:xfrm>
+          <a:prstGeom prst="rect">
+            <a:avLst/>
+          </a:prstGeom>
+        </p:spPr>
+      </p:pic>
+      <p:sp>
+        <p:nvSpPr>
+          <p:cNvPr id="8" name="TextBox 7"/>
+          <p:cNvSpPr txBox="1"/>
+          <p:nvPr/>
+        </p:nvSpPr>
+        <p:spPr>
+          <a:xfrm>
+            <a:off x="130628" y="572756"/>
+            <a:ext cx="5114612" cy="584775"/>
+          </a:xfrm>
+          <a:prstGeom prst="rect">
+            <a:avLst/>
+          </a:prstGeom>
+          <a:noFill/>
+        </p:spPr>
+        <p:txBody>
+          <a:bodyPr wrap="square" rtlCol="0">
+            <a:spAutoFit/>
+          </a:bodyPr>
+          <a:lstStyle/>
+          <a:p>
+            <a:r>
+              <a:rPr lang="en-US" sz="3200" dirty="0" smtClean="0">
+                <a:solidFill>
+                  <a:schemeClr val="bg2">
+                    <a:lumMod val="50000"/>
+                  </a:schemeClr>
+                </a:solidFill>
+              </a:rPr>
+              <a:t>BUSES ROUTE INFORMATION</a:t>
+            </a:r>
+            <a:endParaRPr lang="en-US" sz="3200" dirty="0">
+              <a:solidFill>
+                <a:schemeClr val="bg2">
+                  <a:lumMod val="50000"/>
+                </a:schemeClr>
+              </a:solidFill>
+            </a:endParaRPr>
+          </a:p>
+        </p:txBody>
+      </p:sp>
+      <p:sp>
+        <p:nvSpPr>
+          <p:cNvPr id="9" name="TextBox 8"/>
+          <p:cNvSpPr txBox="1"/>
+          <p:nvPr/>
+        </p:nvSpPr>
+        <p:spPr>
+          <a:xfrm>
+            <a:off x="2303343" y="5245240"/>
+            <a:ext cx="4918462" cy="369332"/>
+          </a:xfrm>
+          <a:prstGeom prst="rect">
+            <a:avLst/>
+          </a:prstGeom>
+          <a:noFill/>
+        </p:spPr>
+        <p:txBody>
+          <a:bodyPr wrap="none" rtlCol="0">
+            <a:spAutoFit/>
+          </a:bodyPr>
+          <a:lstStyle/>
+          <a:p>
+            <a:r>
+              <a:rPr lang="en-US" dirty="0" smtClean="0">
+                <a:solidFill>
+                  <a:schemeClr val="accent4"/>
+                </a:solidFill>
+              </a:rPr>
+              <a:t>http://route.buyttphcm.com.vn/routeoftrunk.aspx</a:t>
+            </a:r>
+            <a:endParaRPr lang="en-US" dirty="0">
+              <a:solidFill>
+                <a:schemeClr val="accent4"/>
+              </a:solidFill>
+            </a:endParaRPr>
+          </a:p>
+        </p:txBody>
+      </p:sp>
+    </p:spTree>
+    <p:extLst>
+      <p:ext uri="{BB962C8B-B14F-4D97-AF65-F5344CB8AC3E}">
+        <p14:creationId xmlns:p14="http://schemas.microsoft.com/office/powerpoint/2010/main" val="4262450386"/>
+      </p:ext>
+    </p:extLst>
+  </p:cSld>
+  <p:clrMapOvr>
+    <a:masterClrMapping/>
+  </p:clrMapOvr>
+  <p:timing>
+    <p:tnLst>
+      <p:par>
+        <p:cTn id="1" dur="indefinite" restart="never" nodeType="tmRoot"/>
+      </p:par>
+    </p:tnLst>
+  </p:timing>
+</p:sld>
+</file>
+
+<file path=ppt/slides/slide20.xml><?xml version="1.0" encoding="utf-8"?>
 <p:sld xmlns:a="http://schemas.openxmlformats.org/drawingml/2006/main" xmlns:r="http://schemas.openxmlformats.org/officeDocument/2006/relationships" xmlns:p="http://schemas.openxmlformats.org/presentationml/2006/main">
   <p:cSld>
     <p:spTree>
@@ -11927,7 +10909,7 @@
 </p:sld>
 </file>
 
-<file path=ppt/slides/slide22.xml><?xml version="1.0" encoding="utf-8"?>
+<file path=ppt/slides/slide21.xml><?xml version="1.0" encoding="utf-8"?>
 <p:sld xmlns:a="http://schemas.openxmlformats.org/drawingml/2006/main" xmlns:r="http://schemas.openxmlformats.org/officeDocument/2006/relationships" xmlns:p="http://schemas.openxmlformats.org/presentationml/2006/main">
   <p:cSld>
     <p:spTree>
@@ -12242,7 +11224,7 @@
 </p:sld>
 </file>
 
-<file path=ppt/slides/slide23.xml><?xml version="1.0" encoding="utf-8"?>
+<file path=ppt/slides/slide22.xml><?xml version="1.0" encoding="utf-8"?>
 <p:sld xmlns:a="http://schemas.openxmlformats.org/drawingml/2006/main" xmlns:r="http://schemas.openxmlformats.org/officeDocument/2006/relationships" xmlns:p="http://schemas.openxmlformats.org/presentationml/2006/main">
   <p:cSld>
     <p:spTree>
@@ -13303,7 +12285,7 @@
 </p:sld>
 </file>
 
-<file path=ppt/slides/slide24.xml><?xml version="1.0" encoding="utf-8"?>
+<file path=ppt/slides/slide23.xml><?xml version="1.0" encoding="utf-8"?>
 <p:sld xmlns:a="http://schemas.openxmlformats.org/drawingml/2006/main" xmlns:r="http://schemas.openxmlformats.org/officeDocument/2006/relationships" xmlns:p="http://schemas.openxmlformats.org/presentationml/2006/main">
   <p:cSld>
     <p:spTree>
@@ -13390,7 +12372,7 @@
 </p:sld>
 </file>
 
-<file path=ppt/slides/slide25.xml><?xml version="1.0" encoding="utf-8"?>
+<file path=ppt/slides/slide24.xml><?xml version="1.0" encoding="utf-8"?>
 <p:sld xmlns:a="http://schemas.openxmlformats.org/drawingml/2006/main" xmlns:r="http://schemas.openxmlformats.org/officeDocument/2006/relationships" xmlns:p="http://schemas.openxmlformats.org/presentationml/2006/main">
   <p:cSld>
     <p:spTree>
@@ -13621,7 +12603,7 @@
 </p:sld>
 </file>
 
-<file path=ppt/slides/slide26.xml><?xml version="1.0" encoding="utf-8"?>
+<file path=ppt/slides/slide25.xml><?xml version="1.0" encoding="utf-8"?>
 <p:sld xmlns:a="http://schemas.openxmlformats.org/drawingml/2006/main" xmlns:r="http://schemas.openxmlformats.org/officeDocument/2006/relationships" xmlns:p="http://schemas.openxmlformats.org/presentationml/2006/main">
   <p:cSld>
     <p:spTree>
@@ -13955,7 +12937,7 @@
 </p:sld>
 </file>
 
-<file path=ppt/slides/slide27.xml><?xml version="1.0" encoding="utf-8"?>
+<file path=ppt/slides/slide26.xml><?xml version="1.0" encoding="utf-8"?>
 <p:sld xmlns:a="http://schemas.openxmlformats.org/drawingml/2006/main" xmlns:r="http://schemas.openxmlformats.org/officeDocument/2006/relationships" xmlns:p="http://schemas.openxmlformats.org/presentationml/2006/main">
   <p:cSld>
     <p:spTree>
@@ -14271,7 +13253,7 @@
 </p:sld>
 </file>
 
-<file path=ppt/slides/slide28.xml><?xml version="1.0" encoding="utf-8"?>
+<file path=ppt/slides/slide27.xml><?xml version="1.0" encoding="utf-8"?>
 <p:sld xmlns:a="http://schemas.openxmlformats.org/drawingml/2006/main" xmlns:r="http://schemas.openxmlformats.org/officeDocument/2006/relationships" xmlns:p="http://schemas.openxmlformats.org/presentationml/2006/main">
   <p:cSld>
     <p:spTree>
@@ -15018,7 +14000,7 @@
 </p:sld>
 </file>
 
-<file path=ppt/slides/slide29.xml><?xml version="1.0" encoding="utf-8"?>
+<file path=ppt/slides/slide28.xml><?xml version="1.0" encoding="utf-8"?>
 <p:sld xmlns:a="http://schemas.openxmlformats.org/drawingml/2006/main" xmlns:r="http://schemas.openxmlformats.org/officeDocument/2006/relationships" xmlns:p="http://schemas.openxmlformats.org/presentationml/2006/main">
   <p:cSld>
     <p:spTree>
@@ -15431,6 +14413,451 @@
     <p:extLst>
       <p:ext uri="{BB962C8B-B14F-4D97-AF65-F5344CB8AC3E}">
         <p14:creationId xmlns:p14="http://schemas.microsoft.com/office/powerpoint/2010/main" val="2581197395"/>
+      </p:ext>
+    </p:extLst>
+  </p:cSld>
+  <p:clrMapOvr>
+    <a:masterClrMapping/>
+  </p:clrMapOvr>
+  <p:timing>
+    <p:tnLst>
+      <p:par>
+        <p:cTn id="1" dur="indefinite" restart="never" nodeType="tmRoot"/>
+      </p:par>
+    </p:tnLst>
+  </p:timing>
+</p:sld>
+</file>
+
+<file path=ppt/slides/slide29.xml><?xml version="1.0" encoding="utf-8"?>
+<p:sld xmlns:a="http://schemas.openxmlformats.org/drawingml/2006/main" xmlns:r="http://schemas.openxmlformats.org/officeDocument/2006/relationships" xmlns:p="http://schemas.openxmlformats.org/presentationml/2006/main">
+  <p:cSld>
+    <p:spTree>
+      <p:nvGrpSpPr>
+        <p:cNvPr id="1" name=""/>
+        <p:cNvGrpSpPr/>
+        <p:nvPr/>
+      </p:nvGrpSpPr>
+      <p:grpSpPr>
+        <a:xfrm>
+          <a:off x="0" y="0"/>
+          <a:ext cx="0" cy="0"/>
+          <a:chOff x="0" y="0"/>
+          <a:chExt cx="0" cy="0"/>
+        </a:xfrm>
+      </p:grpSpPr>
+      <p:sp>
+        <p:nvSpPr>
+          <p:cNvPr id="13" name="TextBox 12"/>
+          <p:cNvSpPr txBox="1"/>
+          <p:nvPr/>
+        </p:nvSpPr>
+        <p:spPr>
+          <a:xfrm>
+            <a:off x="1005840" y="251102"/>
+            <a:ext cx="2137316" cy="369332"/>
+          </a:xfrm>
+          <a:prstGeom prst="rect">
+            <a:avLst/>
+          </a:prstGeom>
+          <a:noFill/>
+        </p:spPr>
+        <p:txBody>
+          <a:bodyPr wrap="none" rtlCol="0">
+            <a:spAutoFit/>
+          </a:bodyPr>
+          <a:lstStyle/>
+          <a:p>
+            <a:r>
+              <a:rPr lang="en-US" dirty="0" smtClean="0">
+                <a:solidFill>
+                  <a:srgbClr val="0070C0"/>
+                </a:solidFill>
+              </a:rPr>
+              <a:t>Time of route depart</a:t>
+            </a:r>
+            <a:endParaRPr lang="en-US" dirty="0"/>
+          </a:p>
+        </p:txBody>
+      </p:sp>
+      <p:sp>
+        <p:nvSpPr>
+          <p:cNvPr id="14" name="Rectangle 13"/>
+          <p:cNvSpPr/>
+          <p:nvPr/>
+        </p:nvSpPr>
+        <p:spPr>
+          <a:xfrm>
+            <a:off x="4588994" y="251102"/>
+            <a:ext cx="2102627" cy="369332"/>
+          </a:xfrm>
+          <a:prstGeom prst="rect">
+            <a:avLst/>
+          </a:prstGeom>
+        </p:spPr>
+        <p:txBody>
+          <a:bodyPr wrap="none">
+            <a:spAutoFit/>
+          </a:bodyPr>
+          <a:lstStyle/>
+          <a:p>
+            <a:r>
+              <a:rPr lang="en-US" dirty="0" smtClean="0">
+                <a:solidFill>
+                  <a:srgbClr val="00B050"/>
+                </a:solidFill>
+              </a:rPr>
+              <a:t>Time of </a:t>
+            </a:r>
+            <a:r>
+              <a:rPr lang="en-US" dirty="0">
+                <a:solidFill>
+                  <a:srgbClr val="00B050"/>
+                </a:solidFill>
+              </a:rPr>
+              <a:t>route </a:t>
+            </a:r>
+            <a:r>
+              <a:rPr lang="en-US" dirty="0" smtClean="0">
+                <a:solidFill>
+                  <a:srgbClr val="00B050"/>
+                </a:solidFill>
+              </a:rPr>
+              <a:t>return</a:t>
+            </a:r>
+            <a:endParaRPr lang="en-US" dirty="0"/>
+          </a:p>
+        </p:txBody>
+      </p:sp>
+      <p:pic>
+        <p:nvPicPr>
+          <p:cNvPr id="15" name="Picture 14"/>
+          <p:cNvPicPr>
+            <a:picLocks noChangeAspect="1"/>
+          </p:cNvPicPr>
+          <p:nvPr/>
+        </p:nvPicPr>
+        <p:blipFill>
+          <a:blip r:embed="rId2">
+            <a:extLst>
+              <a:ext uri="{28A0092B-C50C-407E-A947-70E740481C1C}">
+                <a14:useLocalDpi xmlns:a14="http://schemas.microsoft.com/office/drawing/2010/main" val="0"/>
+              </a:ext>
+            </a:extLst>
+          </a:blip>
+          <a:stretch>
+            <a:fillRect/>
+          </a:stretch>
+        </p:blipFill>
+        <p:spPr>
+          <a:xfrm>
+            <a:off x="192156" y="807720"/>
+            <a:ext cx="6743700" cy="5417820"/>
+          </a:xfrm>
+          <a:prstGeom prst="rect">
+            <a:avLst/>
+          </a:prstGeom>
+        </p:spPr>
+      </p:pic>
+      <p:sp>
+        <p:nvSpPr>
+          <p:cNvPr id="16" name="Rectangle 15"/>
+          <p:cNvSpPr/>
+          <p:nvPr/>
+        </p:nvSpPr>
+        <p:spPr>
+          <a:xfrm>
+            <a:off x="1005840" y="807720"/>
+            <a:ext cx="2903220" cy="5417820"/>
+          </a:xfrm>
+          <a:prstGeom prst="rect">
+            <a:avLst/>
+          </a:prstGeom>
+          <a:noFill/>
+          <a:ln>
+            <a:solidFill>
+              <a:schemeClr val="accent5"/>
+            </a:solidFill>
+          </a:ln>
+        </p:spPr>
+        <p:style>
+          <a:lnRef idx="2">
+            <a:schemeClr val="accent1">
+              <a:shade val="50000"/>
+            </a:schemeClr>
+          </a:lnRef>
+          <a:fillRef idx="1">
+            <a:schemeClr val="accent1"/>
+          </a:fillRef>
+          <a:effectRef idx="0">
+            <a:schemeClr val="accent1"/>
+          </a:effectRef>
+          <a:fontRef idx="minor">
+            <a:schemeClr val="lt1"/>
+          </a:fontRef>
+        </p:style>
+        <p:txBody>
+          <a:bodyPr rtlCol="0" anchor="ctr"/>
+          <a:lstStyle/>
+          <a:p>
+            <a:pPr algn="ctr"/>
+            <a:endParaRPr lang="en-US"/>
+          </a:p>
+        </p:txBody>
+      </p:sp>
+      <p:cxnSp>
+        <p:nvCxnSpPr>
+          <p:cNvPr id="17" name="Straight Connector 16"/>
+          <p:cNvCxnSpPr>
+            <a:stCxn id="13" idx="2"/>
+          </p:cNvCxnSpPr>
+          <p:nvPr/>
+        </p:nvCxnSpPr>
+        <p:spPr>
+          <a:xfrm>
+            <a:off x="2074498" y="620434"/>
+            <a:ext cx="4008" cy="187286"/>
+          </a:xfrm>
+          <a:prstGeom prst="line">
+            <a:avLst/>
+          </a:prstGeom>
+          <a:ln>
+            <a:solidFill>
+              <a:srgbClr val="0070C0"/>
+            </a:solidFill>
+          </a:ln>
+        </p:spPr>
+        <p:style>
+          <a:lnRef idx="3">
+            <a:schemeClr val="accent2"/>
+          </a:lnRef>
+          <a:fillRef idx="0">
+            <a:schemeClr val="accent2"/>
+          </a:fillRef>
+          <a:effectRef idx="2">
+            <a:schemeClr val="accent2"/>
+          </a:effectRef>
+          <a:fontRef idx="minor">
+            <a:schemeClr val="tx1"/>
+          </a:fontRef>
+        </p:style>
+      </p:cxnSp>
+      <p:sp>
+        <p:nvSpPr>
+          <p:cNvPr id="18" name="Rectangle 17"/>
+          <p:cNvSpPr/>
+          <p:nvPr/>
+        </p:nvSpPr>
+        <p:spPr>
+          <a:xfrm>
+            <a:off x="4032636" y="807720"/>
+            <a:ext cx="2903220" cy="5417820"/>
+          </a:xfrm>
+          <a:prstGeom prst="rect">
+            <a:avLst/>
+          </a:prstGeom>
+          <a:noFill/>
+          <a:ln>
+            <a:solidFill>
+              <a:srgbClr val="00B050"/>
+            </a:solidFill>
+          </a:ln>
+        </p:spPr>
+        <p:style>
+          <a:lnRef idx="2">
+            <a:schemeClr val="accent1">
+              <a:shade val="50000"/>
+            </a:schemeClr>
+          </a:lnRef>
+          <a:fillRef idx="1">
+            <a:schemeClr val="accent1"/>
+          </a:fillRef>
+          <a:effectRef idx="0">
+            <a:schemeClr val="accent1"/>
+          </a:effectRef>
+          <a:fontRef idx="minor">
+            <a:schemeClr val="lt1"/>
+          </a:fontRef>
+        </p:style>
+        <p:txBody>
+          <a:bodyPr rtlCol="0" anchor="ctr"/>
+          <a:lstStyle/>
+          <a:p>
+            <a:pPr algn="ctr"/>
+            <a:endParaRPr lang="en-US"/>
+          </a:p>
+        </p:txBody>
+      </p:sp>
+      <p:cxnSp>
+        <p:nvCxnSpPr>
+          <p:cNvPr id="19" name="Straight Connector 18"/>
+          <p:cNvCxnSpPr>
+            <a:stCxn id="14" idx="2"/>
+          </p:cNvCxnSpPr>
+          <p:nvPr/>
+        </p:nvCxnSpPr>
+        <p:spPr>
+          <a:xfrm>
+            <a:off x="5640308" y="620434"/>
+            <a:ext cx="4007" cy="187286"/>
+          </a:xfrm>
+          <a:prstGeom prst="line">
+            <a:avLst/>
+          </a:prstGeom>
+          <a:ln>
+            <a:solidFill>
+              <a:srgbClr val="00B050"/>
+            </a:solidFill>
+          </a:ln>
+        </p:spPr>
+        <p:style>
+          <a:lnRef idx="3">
+            <a:schemeClr val="accent2"/>
+          </a:lnRef>
+          <a:fillRef idx="0">
+            <a:schemeClr val="accent2"/>
+          </a:fillRef>
+          <a:effectRef idx="2">
+            <a:schemeClr val="accent2"/>
+          </a:effectRef>
+          <a:fontRef idx="minor">
+            <a:schemeClr val="tx1"/>
+          </a:fontRef>
+        </p:style>
+      </p:cxnSp>
+      <p:graphicFrame>
+        <p:nvGraphicFramePr>
+          <p:cNvPr id="20" name="Table 19"/>
+          <p:cNvGraphicFramePr>
+            <a:graphicFrameLocks noGrp="1"/>
+          </p:cNvGraphicFramePr>
+          <p:nvPr>
+            <p:extLst>
+              <p:ext uri="{D42A27DB-BD31-4B8C-83A1-F6EECF244321}">
+                <p14:modId xmlns:p14="http://schemas.microsoft.com/office/powerpoint/2010/main" val="3380763958"/>
+              </p:ext>
+            </p:extLst>
+          </p:nvPr>
+        </p:nvGraphicFramePr>
+        <p:xfrm>
+          <a:off x="7214359" y="807720"/>
+          <a:ext cx="1749039" cy="1487396"/>
+        </p:xfrm>
+        <a:graphic>
+          <a:graphicData uri="http://schemas.openxmlformats.org/drawingml/2006/table">
+            <a:tbl>
+              <a:tblPr firstRow="1" bandRow="1">
+                <a:tableStyleId>{21E4AEA4-8DFA-4A89-87EB-49C32662AFE0}</a:tableStyleId>
+              </a:tblPr>
+              <a:tblGrid>
+                <a:gridCol w="1749039"/>
+              </a:tblGrid>
+              <a:tr h="371849">
+                <a:tc>
+                  <a:txBody>
+                    <a:bodyPr/>
+                    <a:lstStyle/>
+                    <a:p>
+                      <a:pPr algn="ctr"/>
+                      <a:r>
+                        <a:rPr lang="en-US" dirty="0" smtClean="0"/>
+                        <a:t>Trip</a:t>
+                      </a:r>
+                      <a:endParaRPr lang="en-US" dirty="0"/>
+                    </a:p>
+                  </a:txBody>
+                  <a:tcPr/>
+                </a:tc>
+              </a:tr>
+              <a:tr h="371849">
+                <a:tc>
+                  <a:txBody>
+                    <a:bodyPr/>
+                    <a:lstStyle/>
+                    <a:p>
+                      <a:r>
+                        <a:rPr lang="en-US" dirty="0" err="1" smtClean="0"/>
+                        <a:t>RouteID</a:t>
+                      </a:r>
+                      <a:endParaRPr lang="en-US" dirty="0"/>
+                    </a:p>
+                  </a:txBody>
+                  <a:tcPr/>
+                </a:tc>
+              </a:tr>
+              <a:tr h="371849">
+                <a:tc>
+                  <a:txBody>
+                    <a:bodyPr/>
+                    <a:lstStyle/>
+                    <a:p>
+                      <a:r>
+                        <a:rPr lang="en-US" dirty="0" err="1" smtClean="0"/>
+                        <a:t>TripNo</a:t>
+                      </a:r>
+                      <a:endParaRPr lang="en-US" dirty="0"/>
+                    </a:p>
+                  </a:txBody>
+                  <a:tcPr/>
+                </a:tc>
+              </a:tr>
+              <a:tr h="371849">
+                <a:tc>
+                  <a:txBody>
+                    <a:bodyPr/>
+                    <a:lstStyle/>
+                    <a:p>
+                      <a:r>
+                        <a:rPr lang="en-US" dirty="0" err="1" smtClean="0"/>
+                        <a:t>StartTime</a:t>
+                      </a:r>
+                      <a:endParaRPr lang="en-US" dirty="0"/>
+                    </a:p>
+                  </a:txBody>
+                  <a:tcPr/>
+                </a:tc>
+              </a:tr>
+            </a:tbl>
+          </a:graphicData>
+        </a:graphic>
+      </p:graphicFrame>
+      <p:cxnSp>
+        <p:nvCxnSpPr>
+          <p:cNvPr id="21" name="Straight Arrow Connector 20"/>
+          <p:cNvCxnSpPr/>
+          <p:nvPr/>
+        </p:nvCxnSpPr>
+        <p:spPr>
+          <a:xfrm flipV="1">
+            <a:off x="2007974" y="2080260"/>
+            <a:ext cx="5284366" cy="624840"/>
+          </a:xfrm>
+          <a:prstGeom prst="straightConnector1">
+            <a:avLst/>
+          </a:prstGeom>
+          <a:ln>
+            <a:tailEnd type="triangle"/>
+          </a:ln>
+        </p:spPr>
+        <p:style>
+          <a:lnRef idx="3">
+            <a:schemeClr val="accent2"/>
+          </a:lnRef>
+          <a:fillRef idx="0">
+            <a:schemeClr val="accent2"/>
+          </a:fillRef>
+          <a:effectRef idx="2">
+            <a:schemeClr val="accent2"/>
+          </a:effectRef>
+          <a:fontRef idx="minor">
+            <a:schemeClr val="tx1"/>
+          </a:fontRef>
+        </p:style>
+      </p:cxnSp>
+    </p:spTree>
+    <p:extLst>
+      <p:ext uri="{BB962C8B-B14F-4D97-AF65-F5344CB8AC3E}">
+        <p14:creationId xmlns:p14="http://schemas.microsoft.com/office/powerpoint/2010/main" val="2883742251"/>
       </p:ext>
     </p:extLst>
   </p:cSld>
@@ -15795,451 +15222,6 @@
       </p:grpSpPr>
       <p:sp>
         <p:nvSpPr>
-          <p:cNvPr id="13" name="TextBox 12"/>
-          <p:cNvSpPr txBox="1"/>
-          <p:nvPr/>
-        </p:nvSpPr>
-        <p:spPr>
-          <a:xfrm>
-            <a:off x="1005840" y="251102"/>
-            <a:ext cx="2137316" cy="369332"/>
-          </a:xfrm>
-          <a:prstGeom prst="rect">
-            <a:avLst/>
-          </a:prstGeom>
-          <a:noFill/>
-        </p:spPr>
-        <p:txBody>
-          <a:bodyPr wrap="none" rtlCol="0">
-            <a:spAutoFit/>
-          </a:bodyPr>
-          <a:lstStyle/>
-          <a:p>
-            <a:r>
-              <a:rPr lang="en-US" dirty="0" smtClean="0">
-                <a:solidFill>
-                  <a:srgbClr val="0070C0"/>
-                </a:solidFill>
-              </a:rPr>
-              <a:t>Time of route depart</a:t>
-            </a:r>
-            <a:endParaRPr lang="en-US" dirty="0"/>
-          </a:p>
-        </p:txBody>
-      </p:sp>
-      <p:sp>
-        <p:nvSpPr>
-          <p:cNvPr id="14" name="Rectangle 13"/>
-          <p:cNvSpPr/>
-          <p:nvPr/>
-        </p:nvSpPr>
-        <p:spPr>
-          <a:xfrm>
-            <a:off x="4588994" y="251102"/>
-            <a:ext cx="2102627" cy="369332"/>
-          </a:xfrm>
-          <a:prstGeom prst="rect">
-            <a:avLst/>
-          </a:prstGeom>
-        </p:spPr>
-        <p:txBody>
-          <a:bodyPr wrap="none">
-            <a:spAutoFit/>
-          </a:bodyPr>
-          <a:lstStyle/>
-          <a:p>
-            <a:r>
-              <a:rPr lang="en-US" dirty="0" smtClean="0">
-                <a:solidFill>
-                  <a:srgbClr val="00B050"/>
-                </a:solidFill>
-              </a:rPr>
-              <a:t>Time of </a:t>
-            </a:r>
-            <a:r>
-              <a:rPr lang="en-US" dirty="0">
-                <a:solidFill>
-                  <a:srgbClr val="00B050"/>
-                </a:solidFill>
-              </a:rPr>
-              <a:t>route </a:t>
-            </a:r>
-            <a:r>
-              <a:rPr lang="en-US" dirty="0" smtClean="0">
-                <a:solidFill>
-                  <a:srgbClr val="00B050"/>
-                </a:solidFill>
-              </a:rPr>
-              <a:t>return</a:t>
-            </a:r>
-            <a:endParaRPr lang="en-US" dirty="0"/>
-          </a:p>
-        </p:txBody>
-      </p:sp>
-      <p:pic>
-        <p:nvPicPr>
-          <p:cNvPr id="15" name="Picture 14"/>
-          <p:cNvPicPr>
-            <a:picLocks noChangeAspect="1"/>
-          </p:cNvPicPr>
-          <p:nvPr/>
-        </p:nvPicPr>
-        <p:blipFill>
-          <a:blip r:embed="rId2">
-            <a:extLst>
-              <a:ext uri="{28A0092B-C50C-407E-A947-70E740481C1C}">
-                <a14:useLocalDpi xmlns:a14="http://schemas.microsoft.com/office/drawing/2010/main" val="0"/>
-              </a:ext>
-            </a:extLst>
-          </a:blip>
-          <a:stretch>
-            <a:fillRect/>
-          </a:stretch>
-        </p:blipFill>
-        <p:spPr>
-          <a:xfrm>
-            <a:off x="192156" y="807720"/>
-            <a:ext cx="6743700" cy="5417820"/>
-          </a:xfrm>
-          <a:prstGeom prst="rect">
-            <a:avLst/>
-          </a:prstGeom>
-        </p:spPr>
-      </p:pic>
-      <p:sp>
-        <p:nvSpPr>
-          <p:cNvPr id="16" name="Rectangle 15"/>
-          <p:cNvSpPr/>
-          <p:nvPr/>
-        </p:nvSpPr>
-        <p:spPr>
-          <a:xfrm>
-            <a:off x="1005840" y="807720"/>
-            <a:ext cx="2903220" cy="5417820"/>
-          </a:xfrm>
-          <a:prstGeom prst="rect">
-            <a:avLst/>
-          </a:prstGeom>
-          <a:noFill/>
-          <a:ln>
-            <a:solidFill>
-              <a:schemeClr val="accent5"/>
-            </a:solidFill>
-          </a:ln>
-        </p:spPr>
-        <p:style>
-          <a:lnRef idx="2">
-            <a:schemeClr val="accent1">
-              <a:shade val="50000"/>
-            </a:schemeClr>
-          </a:lnRef>
-          <a:fillRef idx="1">
-            <a:schemeClr val="accent1"/>
-          </a:fillRef>
-          <a:effectRef idx="0">
-            <a:schemeClr val="accent1"/>
-          </a:effectRef>
-          <a:fontRef idx="minor">
-            <a:schemeClr val="lt1"/>
-          </a:fontRef>
-        </p:style>
-        <p:txBody>
-          <a:bodyPr rtlCol="0" anchor="ctr"/>
-          <a:lstStyle/>
-          <a:p>
-            <a:pPr algn="ctr"/>
-            <a:endParaRPr lang="en-US"/>
-          </a:p>
-        </p:txBody>
-      </p:sp>
-      <p:cxnSp>
-        <p:nvCxnSpPr>
-          <p:cNvPr id="17" name="Straight Connector 16"/>
-          <p:cNvCxnSpPr>
-            <a:stCxn id="13" idx="2"/>
-          </p:cNvCxnSpPr>
-          <p:nvPr/>
-        </p:nvCxnSpPr>
-        <p:spPr>
-          <a:xfrm>
-            <a:off x="2074498" y="620434"/>
-            <a:ext cx="4008" cy="187286"/>
-          </a:xfrm>
-          <a:prstGeom prst="line">
-            <a:avLst/>
-          </a:prstGeom>
-          <a:ln>
-            <a:solidFill>
-              <a:srgbClr val="0070C0"/>
-            </a:solidFill>
-          </a:ln>
-        </p:spPr>
-        <p:style>
-          <a:lnRef idx="3">
-            <a:schemeClr val="accent2"/>
-          </a:lnRef>
-          <a:fillRef idx="0">
-            <a:schemeClr val="accent2"/>
-          </a:fillRef>
-          <a:effectRef idx="2">
-            <a:schemeClr val="accent2"/>
-          </a:effectRef>
-          <a:fontRef idx="minor">
-            <a:schemeClr val="tx1"/>
-          </a:fontRef>
-        </p:style>
-      </p:cxnSp>
-      <p:sp>
-        <p:nvSpPr>
-          <p:cNvPr id="18" name="Rectangle 17"/>
-          <p:cNvSpPr/>
-          <p:nvPr/>
-        </p:nvSpPr>
-        <p:spPr>
-          <a:xfrm>
-            <a:off x="4032636" y="807720"/>
-            <a:ext cx="2903220" cy="5417820"/>
-          </a:xfrm>
-          <a:prstGeom prst="rect">
-            <a:avLst/>
-          </a:prstGeom>
-          <a:noFill/>
-          <a:ln>
-            <a:solidFill>
-              <a:srgbClr val="00B050"/>
-            </a:solidFill>
-          </a:ln>
-        </p:spPr>
-        <p:style>
-          <a:lnRef idx="2">
-            <a:schemeClr val="accent1">
-              <a:shade val="50000"/>
-            </a:schemeClr>
-          </a:lnRef>
-          <a:fillRef idx="1">
-            <a:schemeClr val="accent1"/>
-          </a:fillRef>
-          <a:effectRef idx="0">
-            <a:schemeClr val="accent1"/>
-          </a:effectRef>
-          <a:fontRef idx="minor">
-            <a:schemeClr val="lt1"/>
-          </a:fontRef>
-        </p:style>
-        <p:txBody>
-          <a:bodyPr rtlCol="0" anchor="ctr"/>
-          <a:lstStyle/>
-          <a:p>
-            <a:pPr algn="ctr"/>
-            <a:endParaRPr lang="en-US"/>
-          </a:p>
-        </p:txBody>
-      </p:sp>
-      <p:cxnSp>
-        <p:nvCxnSpPr>
-          <p:cNvPr id="19" name="Straight Connector 18"/>
-          <p:cNvCxnSpPr>
-            <a:stCxn id="14" idx="2"/>
-          </p:cNvCxnSpPr>
-          <p:nvPr/>
-        </p:nvCxnSpPr>
-        <p:spPr>
-          <a:xfrm>
-            <a:off x="5640308" y="620434"/>
-            <a:ext cx="4007" cy="187286"/>
-          </a:xfrm>
-          <a:prstGeom prst="line">
-            <a:avLst/>
-          </a:prstGeom>
-          <a:ln>
-            <a:solidFill>
-              <a:srgbClr val="00B050"/>
-            </a:solidFill>
-          </a:ln>
-        </p:spPr>
-        <p:style>
-          <a:lnRef idx="3">
-            <a:schemeClr val="accent2"/>
-          </a:lnRef>
-          <a:fillRef idx="0">
-            <a:schemeClr val="accent2"/>
-          </a:fillRef>
-          <a:effectRef idx="2">
-            <a:schemeClr val="accent2"/>
-          </a:effectRef>
-          <a:fontRef idx="minor">
-            <a:schemeClr val="tx1"/>
-          </a:fontRef>
-        </p:style>
-      </p:cxnSp>
-      <p:graphicFrame>
-        <p:nvGraphicFramePr>
-          <p:cNvPr id="20" name="Table 19"/>
-          <p:cNvGraphicFramePr>
-            <a:graphicFrameLocks noGrp="1"/>
-          </p:cNvGraphicFramePr>
-          <p:nvPr>
-            <p:extLst>
-              <p:ext uri="{D42A27DB-BD31-4B8C-83A1-F6EECF244321}">
-                <p14:modId xmlns:p14="http://schemas.microsoft.com/office/powerpoint/2010/main" val="3380763958"/>
-              </p:ext>
-            </p:extLst>
-          </p:nvPr>
-        </p:nvGraphicFramePr>
-        <p:xfrm>
-          <a:off x="7214359" y="807720"/>
-          <a:ext cx="1749039" cy="1487396"/>
-        </p:xfrm>
-        <a:graphic>
-          <a:graphicData uri="http://schemas.openxmlformats.org/drawingml/2006/table">
-            <a:tbl>
-              <a:tblPr firstRow="1" bandRow="1">
-                <a:tableStyleId>{21E4AEA4-8DFA-4A89-87EB-49C32662AFE0}</a:tableStyleId>
-              </a:tblPr>
-              <a:tblGrid>
-                <a:gridCol w="1749039"/>
-              </a:tblGrid>
-              <a:tr h="371849">
-                <a:tc>
-                  <a:txBody>
-                    <a:bodyPr/>
-                    <a:lstStyle/>
-                    <a:p>
-                      <a:pPr algn="ctr"/>
-                      <a:r>
-                        <a:rPr lang="en-US" dirty="0" smtClean="0"/>
-                        <a:t>Trip</a:t>
-                      </a:r>
-                      <a:endParaRPr lang="en-US" dirty="0"/>
-                    </a:p>
-                  </a:txBody>
-                  <a:tcPr/>
-                </a:tc>
-              </a:tr>
-              <a:tr h="371849">
-                <a:tc>
-                  <a:txBody>
-                    <a:bodyPr/>
-                    <a:lstStyle/>
-                    <a:p>
-                      <a:r>
-                        <a:rPr lang="en-US" dirty="0" err="1" smtClean="0"/>
-                        <a:t>RouteID</a:t>
-                      </a:r>
-                      <a:endParaRPr lang="en-US" dirty="0"/>
-                    </a:p>
-                  </a:txBody>
-                  <a:tcPr/>
-                </a:tc>
-              </a:tr>
-              <a:tr h="371849">
-                <a:tc>
-                  <a:txBody>
-                    <a:bodyPr/>
-                    <a:lstStyle/>
-                    <a:p>
-                      <a:r>
-                        <a:rPr lang="en-US" dirty="0" err="1" smtClean="0"/>
-                        <a:t>TripNo</a:t>
-                      </a:r>
-                      <a:endParaRPr lang="en-US" dirty="0"/>
-                    </a:p>
-                  </a:txBody>
-                  <a:tcPr/>
-                </a:tc>
-              </a:tr>
-              <a:tr h="371849">
-                <a:tc>
-                  <a:txBody>
-                    <a:bodyPr/>
-                    <a:lstStyle/>
-                    <a:p>
-                      <a:r>
-                        <a:rPr lang="en-US" dirty="0" err="1" smtClean="0"/>
-                        <a:t>StartTime</a:t>
-                      </a:r>
-                      <a:endParaRPr lang="en-US" dirty="0"/>
-                    </a:p>
-                  </a:txBody>
-                  <a:tcPr/>
-                </a:tc>
-              </a:tr>
-            </a:tbl>
-          </a:graphicData>
-        </a:graphic>
-      </p:graphicFrame>
-      <p:cxnSp>
-        <p:nvCxnSpPr>
-          <p:cNvPr id="21" name="Straight Arrow Connector 20"/>
-          <p:cNvCxnSpPr/>
-          <p:nvPr/>
-        </p:nvCxnSpPr>
-        <p:spPr>
-          <a:xfrm flipV="1">
-            <a:off x="2007974" y="2080260"/>
-            <a:ext cx="5284366" cy="624840"/>
-          </a:xfrm>
-          <a:prstGeom prst="straightConnector1">
-            <a:avLst/>
-          </a:prstGeom>
-          <a:ln>
-            <a:tailEnd type="triangle"/>
-          </a:ln>
-        </p:spPr>
-        <p:style>
-          <a:lnRef idx="3">
-            <a:schemeClr val="accent2"/>
-          </a:lnRef>
-          <a:fillRef idx="0">
-            <a:schemeClr val="accent2"/>
-          </a:fillRef>
-          <a:effectRef idx="2">
-            <a:schemeClr val="accent2"/>
-          </a:effectRef>
-          <a:fontRef idx="minor">
-            <a:schemeClr val="tx1"/>
-          </a:fontRef>
-        </p:style>
-      </p:cxnSp>
-    </p:spTree>
-    <p:extLst>
-      <p:ext uri="{BB962C8B-B14F-4D97-AF65-F5344CB8AC3E}">
-        <p14:creationId xmlns:p14="http://schemas.microsoft.com/office/powerpoint/2010/main" val="2883742251"/>
-      </p:ext>
-    </p:extLst>
-  </p:cSld>
-  <p:clrMapOvr>
-    <a:masterClrMapping/>
-  </p:clrMapOvr>
-  <p:timing>
-    <p:tnLst>
-      <p:par>
-        <p:cTn id="1" dur="indefinite" restart="never" nodeType="tmRoot"/>
-      </p:par>
-    </p:tnLst>
-  </p:timing>
-</p:sld>
-</file>
-
-<file path=ppt/slides/slide31.xml><?xml version="1.0" encoding="utf-8"?>
-<p:sld xmlns:a="http://schemas.openxmlformats.org/drawingml/2006/main" xmlns:r="http://schemas.openxmlformats.org/officeDocument/2006/relationships" xmlns:p="http://schemas.openxmlformats.org/presentationml/2006/main">
-  <p:cSld>
-    <p:spTree>
-      <p:nvGrpSpPr>
-        <p:cNvPr id="1" name=""/>
-        <p:cNvGrpSpPr/>
-        <p:nvPr/>
-      </p:nvGrpSpPr>
-      <p:grpSpPr>
-        <a:xfrm>
-          <a:off x="0" y="0"/>
-          <a:ext cx="0" cy="0"/>
-          <a:chOff x="0" y="0"/>
-          <a:chExt cx="0" cy="0"/>
-        </a:xfrm>
-      </p:grpSpPr>
-      <p:sp>
-        <p:nvSpPr>
           <p:cNvPr id="20" name="TextBox 19"/>
           <p:cNvSpPr txBox="1"/>
           <p:nvPr/>
@@ -16682,7 +15664,7 @@
 </p:sld>
 </file>
 
-<file path=ppt/slides/slide32.xml><?xml version="1.0" encoding="utf-8"?>
+<file path=ppt/slides/slide31.xml><?xml version="1.0" encoding="utf-8"?>
 <p:sld xmlns:a="http://schemas.openxmlformats.org/drawingml/2006/main" xmlns:r="http://schemas.openxmlformats.org/officeDocument/2006/relationships" xmlns:p="http://schemas.openxmlformats.org/presentationml/2006/main">
   <p:cSld>
     <p:spTree>
@@ -18054,163 +17036,6 @@
           <a:chExt cx="0" cy="0"/>
         </a:xfrm>
       </p:grpSpPr>
-      <p:pic>
-        <p:nvPicPr>
-          <p:cNvPr id="4" name="Picture 3"/>
-          <p:cNvPicPr>
-            <a:picLocks noChangeAspect="1"/>
-          </p:cNvPicPr>
-          <p:nvPr/>
-        </p:nvPicPr>
-        <p:blipFill>
-          <a:blip r:embed="rId2">
-            <a:extLst>
-              <a:ext uri="{28A0092B-C50C-407E-A947-70E740481C1C}">
-                <a14:useLocalDpi xmlns:a14="http://schemas.microsoft.com/office/drawing/2010/main" val="0"/>
-              </a:ext>
-            </a:extLst>
-          </a:blip>
-          <a:stretch>
-            <a:fillRect/>
-          </a:stretch>
-        </p:blipFill>
-        <p:spPr>
-          <a:xfrm>
-            <a:off x="373380" y="373380"/>
-            <a:ext cx="4526934" cy="5935980"/>
-          </a:xfrm>
-          <a:prstGeom prst="rect">
-            <a:avLst/>
-          </a:prstGeom>
-        </p:spPr>
-      </p:pic>
-      <p:pic>
-        <p:nvPicPr>
-          <p:cNvPr id="5" name="Picture 4"/>
-          <p:cNvPicPr>
-            <a:picLocks noChangeAspect="1"/>
-          </p:cNvPicPr>
-          <p:nvPr/>
-        </p:nvPicPr>
-        <p:blipFill>
-          <a:blip r:embed="rId3">
-            <a:extLst>
-              <a:ext uri="{28A0092B-C50C-407E-A947-70E740481C1C}">
-                <a14:useLocalDpi xmlns:a14="http://schemas.microsoft.com/office/drawing/2010/main" val="0"/>
-              </a:ext>
-            </a:extLst>
-          </a:blip>
-          <a:stretch>
-            <a:fillRect/>
-          </a:stretch>
-        </p:blipFill>
-        <p:spPr>
-          <a:xfrm>
-            <a:off x="5113021" y="106680"/>
-            <a:ext cx="3322320" cy="6121947"/>
-          </a:xfrm>
-          <a:prstGeom prst="rect">
-            <a:avLst/>
-          </a:prstGeom>
-        </p:spPr>
-      </p:pic>
-      <p:sp>
-        <p:nvSpPr>
-          <p:cNvPr id="6" name="Rectangle 5"/>
-          <p:cNvSpPr/>
-          <p:nvPr/>
-        </p:nvSpPr>
-        <p:spPr>
-          <a:xfrm>
-            <a:off x="944881" y="6309360"/>
-            <a:ext cx="7490460" cy="338554"/>
-          </a:xfrm>
-          <a:prstGeom prst="rect">
-            <a:avLst/>
-          </a:prstGeom>
-        </p:spPr>
-        <p:txBody>
-          <a:bodyPr wrap="square">
-            <a:spAutoFit/>
-          </a:bodyPr>
-          <a:lstStyle/>
-          <a:p>
-            <a:r>
-              <a:rPr lang="en-US" sz="1600" dirty="0" smtClean="0">
-                <a:latin typeface="Cambria" panose="02040503050406030204" pitchFamily="18" charset="0"/>
-              </a:rPr>
-              <a:t>http://mapbus.ebms.vn/ajax.aspx?action=listRouteStations&amp;</a:t>
-            </a:r>
-            <a:r>
-              <a:rPr lang="en-US" sz="1600" dirty="0" smtClean="0">
-                <a:solidFill>
-                  <a:srgbClr val="FF0000"/>
-                </a:solidFill>
-                <a:latin typeface="Cambria" panose="02040503050406030204" pitchFamily="18" charset="0"/>
-              </a:rPr>
-              <a:t>rid=1</a:t>
-            </a:r>
-            <a:r>
-              <a:rPr lang="en-US" sz="1600" dirty="0" smtClean="0">
-                <a:latin typeface="Cambria" panose="02040503050406030204" pitchFamily="18" charset="0"/>
-              </a:rPr>
-              <a:t>&amp;</a:t>
-            </a:r>
-            <a:r>
-              <a:rPr lang="en-US" sz="1600" dirty="0" smtClean="0">
-                <a:solidFill>
-                  <a:srgbClr val="FF0000"/>
-                </a:solidFill>
-                <a:latin typeface="Cambria" panose="02040503050406030204" pitchFamily="18" charset="0"/>
-              </a:rPr>
-              <a:t>isgo=true</a:t>
-            </a:r>
-            <a:endParaRPr lang="en-US" sz="1600" dirty="0">
-              <a:solidFill>
-                <a:srgbClr val="FF0000"/>
-              </a:solidFill>
-              <a:latin typeface="Cambria" panose="02040503050406030204" pitchFamily="18" charset="0"/>
-            </a:endParaRPr>
-          </a:p>
-        </p:txBody>
-      </p:sp>
-    </p:spTree>
-    <p:extLst>
-      <p:ext uri="{BB962C8B-B14F-4D97-AF65-F5344CB8AC3E}">
-        <p14:creationId xmlns:p14="http://schemas.microsoft.com/office/powerpoint/2010/main" val="208184830"/>
-      </p:ext>
-    </p:extLst>
-  </p:cSld>
-  <p:clrMapOvr>
-    <a:masterClrMapping/>
-  </p:clrMapOvr>
-  <p:timing>
-    <p:tnLst>
-      <p:par>
-        <p:cTn id="1" dur="indefinite" restart="never" nodeType="tmRoot"/>
-      </p:par>
-    </p:tnLst>
-  </p:timing>
-</p:sld>
-</file>
-
-<file path=ppt/slides/slide5.xml><?xml version="1.0" encoding="utf-8"?>
-<p:sld xmlns:a="http://schemas.openxmlformats.org/drawingml/2006/main" xmlns:r="http://schemas.openxmlformats.org/officeDocument/2006/relationships" xmlns:p="http://schemas.openxmlformats.org/presentationml/2006/main">
-  <p:cSld>
-    <p:spTree>
-      <p:nvGrpSpPr>
-        <p:cNvPr id="1" name=""/>
-        <p:cNvGrpSpPr/>
-        <p:nvPr/>
-      </p:nvGrpSpPr>
-      <p:grpSpPr>
-        <a:xfrm>
-          <a:off x="0" y="0"/>
-          <a:ext cx="0" cy="0"/>
-          <a:chOff x="0" y="0"/>
-          <a:chExt cx="0" cy="0"/>
-        </a:xfrm>
-      </p:grpSpPr>
       <p:graphicFrame>
         <p:nvGraphicFramePr>
           <p:cNvPr id="4" name="Table 3"/>
@@ -19194,7 +18019,7 @@
 </p:sld>
 </file>
 
-<file path=ppt/slides/slide6.xml><?xml version="1.0" encoding="utf-8"?>
+<file path=ppt/slides/slide5.xml><?xml version="1.0" encoding="utf-8"?>
 <p:sld xmlns:a="http://schemas.openxmlformats.org/drawingml/2006/main" xmlns:r="http://schemas.openxmlformats.org/officeDocument/2006/relationships" xmlns:p="http://schemas.openxmlformats.org/presentationml/2006/main">
   <p:cSld>
     <p:spTree>
@@ -19288,7 +18113,7 @@
 </p:sld>
 </file>
 
-<file path=ppt/slides/slide7.xml><?xml version="1.0" encoding="utf-8"?>
+<file path=ppt/slides/slide6.xml><?xml version="1.0" encoding="utf-8"?>
 <p:sld xmlns:a="http://schemas.openxmlformats.org/drawingml/2006/main" xmlns:r="http://schemas.openxmlformats.org/officeDocument/2006/relationships" xmlns:p="http://schemas.openxmlformats.org/presentationml/2006/main">
   <p:cSld>
     <p:spTree>
@@ -19348,7 +18173,7 @@
 </p:sld>
 </file>
 
-<file path=ppt/slides/slide8.xml><?xml version="1.0" encoding="utf-8"?>
+<file path=ppt/slides/slide7.xml><?xml version="1.0" encoding="utf-8"?>
 <p:sld xmlns:a="http://schemas.openxmlformats.org/drawingml/2006/main" xmlns:r="http://schemas.openxmlformats.org/officeDocument/2006/relationships" xmlns:p="http://schemas.openxmlformats.org/presentationml/2006/main">
   <p:cSld>
     <p:spTree>
@@ -20555,7 +19380,7 @@
 </p:sld>
 </file>
 
-<file path=ppt/slides/slide9.xml><?xml version="1.0" encoding="utf-8"?>
+<file path=ppt/slides/slide8.xml><?xml version="1.0" encoding="utf-8"?>
 <p:sld xmlns:a="http://schemas.openxmlformats.org/drawingml/2006/main" xmlns:r="http://schemas.openxmlformats.org/officeDocument/2006/relationships" xmlns:p="http://schemas.openxmlformats.org/presentationml/2006/main">
   <p:cSld>
     <p:spTree>
@@ -21516,6 +20341,1071 @@
     <p:extLst>
       <p:ext uri="{BB962C8B-B14F-4D97-AF65-F5344CB8AC3E}">
         <p14:creationId xmlns:p14="http://schemas.microsoft.com/office/powerpoint/2010/main" val="3706876221"/>
+      </p:ext>
+    </p:extLst>
+  </p:cSld>
+  <p:clrMapOvr>
+    <a:masterClrMapping/>
+  </p:clrMapOvr>
+  <p:timing>
+    <p:tnLst>
+      <p:par>
+        <p:cTn id="1" dur="indefinite" restart="never" nodeType="tmRoot"/>
+      </p:par>
+    </p:tnLst>
+  </p:timing>
+</p:sld>
+</file>
+
+<file path=ppt/slides/slide9.xml><?xml version="1.0" encoding="utf-8"?>
+<p:sld xmlns:a="http://schemas.openxmlformats.org/drawingml/2006/main" xmlns:r="http://schemas.openxmlformats.org/officeDocument/2006/relationships" xmlns:p="http://schemas.openxmlformats.org/presentationml/2006/main">
+  <p:cSld>
+    <p:spTree>
+      <p:nvGrpSpPr>
+        <p:cNvPr id="1" name=""/>
+        <p:cNvGrpSpPr/>
+        <p:nvPr/>
+      </p:nvGrpSpPr>
+      <p:grpSpPr>
+        <a:xfrm>
+          <a:off x="0" y="0"/>
+          <a:ext cx="0" cy="0"/>
+          <a:chOff x="0" y="0"/>
+          <a:chExt cx="0" cy="0"/>
+        </a:xfrm>
+      </p:grpSpPr>
+      <p:graphicFrame>
+        <p:nvGraphicFramePr>
+          <p:cNvPr id="10" name="Table 9"/>
+          <p:cNvGraphicFramePr>
+            <a:graphicFrameLocks noGrp="1"/>
+          </p:cNvGraphicFramePr>
+          <p:nvPr>
+            <p:extLst>
+              <p:ext uri="{D42A27DB-BD31-4B8C-83A1-F6EECF244321}">
+                <p14:modId xmlns:p14="http://schemas.microsoft.com/office/powerpoint/2010/main" val="1905963055"/>
+              </p:ext>
+            </p:extLst>
+          </p:nvPr>
+        </p:nvGraphicFramePr>
+        <p:xfrm>
+          <a:off x="106679" y="81588"/>
+          <a:ext cx="5501641" cy="6187440"/>
+        </p:xfrm>
+        <a:graphic>
+          <a:graphicData uri="http://schemas.openxmlformats.org/drawingml/2006/table">
+            <a:tbl>
+              <a:tblPr firstRow="1" bandRow="1">
+                <a:tableStyleId>{5C22544A-7EE6-4342-B048-85BDC9FD1C3A}</a:tableStyleId>
+              </a:tblPr>
+              <a:tblGrid>
+                <a:gridCol w="727002"/>
+                <a:gridCol w="4774639"/>
+              </a:tblGrid>
+              <a:tr h="360336">
+                <a:tc>
+                  <a:txBody>
+                    <a:bodyPr/>
+                    <a:lstStyle/>
+                    <a:p>
+                      <a:pPr algn="ctr"/>
+                      <a:r>
+                        <a:rPr lang="en-US" sz="1600" dirty="0" smtClean="0">
+                          <a:latin typeface="Cambria" panose="02040503050406030204" pitchFamily="18" charset="0"/>
+                        </a:rPr>
+                        <a:t>Index</a:t>
+                      </a:r>
+                      <a:endParaRPr lang="en-US" sz="1600" dirty="0">
+                        <a:latin typeface="Cambria" panose="02040503050406030204" pitchFamily="18" charset="0"/>
+                      </a:endParaRPr>
+                    </a:p>
+                  </a:txBody>
+                  <a:tcPr/>
+                </a:tc>
+                <a:tc>
+                  <a:txBody>
+                    <a:bodyPr/>
+                    <a:lstStyle/>
+                    <a:p>
+                      <a:pPr algn="ctr"/>
+                      <a:r>
+                        <a:rPr lang="en-US" dirty="0" smtClean="0">
+                          <a:latin typeface="Cambria" panose="02040503050406030204" pitchFamily="18" charset="0"/>
+                        </a:rPr>
+                        <a:t>Sample value</a:t>
+                      </a:r>
+                      <a:endParaRPr lang="en-US" dirty="0">
+                        <a:latin typeface="Cambria" panose="02040503050406030204" pitchFamily="18" charset="0"/>
+                      </a:endParaRPr>
+                    </a:p>
+                  </a:txBody>
+                  <a:tcPr/>
+                </a:tc>
+              </a:tr>
+              <a:tr h="360336">
+                <a:tc>
+                  <a:txBody>
+                    <a:bodyPr/>
+                    <a:lstStyle/>
+                    <a:p>
+                      <a:pPr algn="ctr"/>
+                      <a:r>
+                        <a:rPr lang="en-US" smtClean="0">
+                          <a:latin typeface="Cambria" panose="02040503050406030204" pitchFamily="18" charset="0"/>
+                        </a:rPr>
+                        <a:t>0</a:t>
+                      </a:r>
+                      <a:endParaRPr lang="en-US" dirty="0">
+                        <a:latin typeface="Cambria" panose="02040503050406030204" pitchFamily="18" charset="0"/>
+                      </a:endParaRPr>
+                    </a:p>
+                  </a:txBody>
+                  <a:tcPr/>
+                </a:tc>
+                <a:tc>
+                  <a:txBody>
+                    <a:bodyPr/>
+                    <a:lstStyle/>
+                    <a:p>
+                      <a:pPr algn="ctr"/>
+                      <a:r>
+                        <a:rPr lang="en-US" smtClean="0">
+                          <a:latin typeface="Cambria" panose="02040503050406030204" pitchFamily="18" charset="0"/>
+                        </a:rPr>
+                        <a:t>1</a:t>
+                      </a:r>
+                      <a:endParaRPr lang="en-US" dirty="0">
+                        <a:latin typeface="Cambria" panose="02040503050406030204" pitchFamily="18" charset="0"/>
+                      </a:endParaRPr>
+                    </a:p>
+                  </a:txBody>
+                  <a:tcPr/>
+                </a:tc>
+              </a:tr>
+              <a:tr h="360336">
+                <a:tc>
+                  <a:txBody>
+                    <a:bodyPr/>
+                    <a:lstStyle/>
+                    <a:p>
+                      <a:pPr algn="ctr"/>
+                      <a:r>
+                        <a:rPr lang="en-US" smtClean="0">
+                          <a:latin typeface="Cambria" panose="02040503050406030204" pitchFamily="18" charset="0"/>
+                        </a:rPr>
+                        <a:t>1</a:t>
+                      </a:r>
+                      <a:endParaRPr lang="en-US" dirty="0">
+                        <a:latin typeface="Cambria" panose="02040503050406030204" pitchFamily="18" charset="0"/>
+                      </a:endParaRPr>
+                    </a:p>
+                  </a:txBody>
+                  <a:tcPr/>
+                </a:tc>
+                <a:tc>
+                  <a:txBody>
+                    <a:bodyPr/>
+                    <a:lstStyle/>
+                    <a:p>
+                      <a:pPr algn="ctr"/>
+                      <a:r>
+                        <a:rPr lang="en-US" smtClean="0">
+                          <a:latin typeface="Cambria" panose="02040503050406030204" pitchFamily="18" charset="0"/>
+                        </a:rPr>
+                        <a:t>8999</a:t>
+                      </a:r>
+                      <a:endParaRPr lang="en-US" dirty="0">
+                        <a:latin typeface="Cambria" panose="02040503050406030204" pitchFamily="18" charset="0"/>
+                      </a:endParaRPr>
+                    </a:p>
+                  </a:txBody>
+                  <a:tcPr/>
+                </a:tc>
+              </a:tr>
+              <a:tr h="360336">
+                <a:tc>
+                  <a:txBody>
+                    <a:bodyPr/>
+                    <a:lstStyle/>
+                    <a:p>
+                      <a:pPr algn="ctr"/>
+                      <a:r>
+                        <a:rPr lang="en-US" smtClean="0">
+                          <a:latin typeface="Cambria" panose="02040503050406030204" pitchFamily="18" charset="0"/>
+                        </a:rPr>
+                        <a:t>2</a:t>
+                      </a:r>
+                      <a:endParaRPr lang="en-US" dirty="0">
+                        <a:latin typeface="Cambria" panose="02040503050406030204" pitchFamily="18" charset="0"/>
+                      </a:endParaRPr>
+                    </a:p>
+                  </a:txBody>
+                  <a:tcPr/>
+                </a:tc>
+                <a:tc>
+                  <a:txBody>
+                    <a:bodyPr/>
+                    <a:lstStyle/>
+                    <a:p>
+                      <a:pPr algn="ctr"/>
+                      <a:r>
+                        <a:rPr lang="en-US" dirty="0" smtClean="0">
+                          <a:latin typeface="Cambria" panose="02040503050406030204" pitchFamily="18" charset="0"/>
+                        </a:rPr>
+                        <a:t>8994</a:t>
+                      </a:r>
+                      <a:endParaRPr lang="en-US" dirty="0">
+                        <a:latin typeface="Cambria" panose="02040503050406030204" pitchFamily="18" charset="0"/>
+                      </a:endParaRPr>
+                    </a:p>
+                  </a:txBody>
+                  <a:tcPr/>
+                </a:tc>
+              </a:tr>
+              <a:tr h="1050981">
+                <a:tc>
+                  <a:txBody>
+                    <a:bodyPr/>
+                    <a:lstStyle/>
+                    <a:p>
+                      <a:pPr algn="ctr"/>
+                      <a:r>
+                        <a:rPr lang="en-US" smtClean="0">
+                          <a:latin typeface="Cambria" panose="02040503050406030204" pitchFamily="18" charset="0"/>
+                        </a:rPr>
+                        <a:t>3</a:t>
+                      </a:r>
+                      <a:endParaRPr lang="en-US" dirty="0">
+                        <a:latin typeface="Cambria" panose="02040503050406030204" pitchFamily="18" charset="0"/>
+                      </a:endParaRPr>
+                    </a:p>
+                  </a:txBody>
+                  <a:tcPr/>
+                </a:tc>
+                <a:tc>
+                  <a:txBody>
+                    <a:bodyPr/>
+                    <a:lstStyle/>
+                    <a:p>
+                      <a:pPr marL="0" marR="0" indent="0" algn="ctr" defTabSz="914400" rtl="0" eaLnBrk="1" fontAlgn="auto" latinLnBrk="0" hangingPunct="1">
+                        <a:lnSpc>
+                          <a:spcPct val="100000"/>
+                        </a:lnSpc>
+                        <a:spcBef>
+                          <a:spcPts val="0"/>
+                        </a:spcBef>
+                        <a:spcAft>
+                          <a:spcPts val="0"/>
+                        </a:spcAft>
+                        <a:buClrTx/>
+                        <a:buSzTx/>
+                        <a:buFontTx/>
+                        <a:buNone/>
+                        <a:tabLst/>
+                        <a:defRPr/>
+                      </a:pPr>
+                      <a:r>
+                        <a:rPr lang="en-US" sz="1600" b="0" i="0" kern="1200" dirty="0" smtClean="0">
+                          <a:solidFill>
+                            <a:schemeClr val="dk1"/>
+                          </a:solidFill>
+                          <a:effectLst/>
+                          <a:latin typeface="Cambria" panose="02040503050406030204" pitchFamily="18" charset="0"/>
+                          <a:ea typeface="+mn-ea"/>
+                          <a:cs typeface="+mn-cs"/>
+                        </a:rPr>
+                        <a:t>106.70589000000001,10.776800000000001 106.70627,10.775810000000002 106.70623,10.77579 106.70617000000001,10.77576 ...</a:t>
+                      </a:r>
+                      <a:endParaRPr lang="en-US" sz="1600" dirty="0" smtClean="0">
+                        <a:latin typeface="Cambria" panose="02040503050406030204" pitchFamily="18" charset="0"/>
+                      </a:endParaRPr>
+                    </a:p>
+                  </a:txBody>
+                  <a:tcPr/>
+                </a:tc>
+              </a:tr>
+              <a:tr h="360336">
+                <a:tc>
+                  <a:txBody>
+                    <a:bodyPr/>
+                    <a:lstStyle/>
+                    <a:p>
+                      <a:pPr algn="ctr"/>
+                      <a:r>
+                        <a:rPr lang="en-US" smtClean="0">
+                          <a:latin typeface="Cambria" panose="02040503050406030204" pitchFamily="18" charset="0"/>
+                        </a:rPr>
+                        <a:t>4</a:t>
+                      </a:r>
+                      <a:endParaRPr lang="en-US" dirty="0">
+                        <a:latin typeface="Cambria" panose="02040503050406030204" pitchFamily="18" charset="0"/>
+                      </a:endParaRPr>
+                    </a:p>
+                  </a:txBody>
+                  <a:tcPr/>
+                </a:tc>
+                <a:tc>
+                  <a:txBody>
+                    <a:bodyPr/>
+                    <a:lstStyle/>
+                    <a:p>
+                      <a:pPr algn="ctr"/>
+                      <a:r>
+                        <a:rPr lang="en-US" smtClean="0">
+                          <a:latin typeface="Cambria" panose="02040503050406030204" pitchFamily="18" charset="0"/>
+                        </a:rPr>
+                        <a:t>True</a:t>
+                      </a:r>
+                      <a:endParaRPr lang="en-US" dirty="0">
+                        <a:latin typeface="Cambria" panose="02040503050406030204" pitchFamily="18" charset="0"/>
+                      </a:endParaRPr>
+                    </a:p>
+                  </a:txBody>
+                  <a:tcPr/>
+                </a:tc>
+              </a:tr>
+              <a:tr h="360336">
+                <a:tc>
+                  <a:txBody>
+                    <a:bodyPr/>
+                    <a:lstStyle/>
+                    <a:p>
+                      <a:pPr algn="ctr"/>
+                      <a:r>
+                        <a:rPr lang="en-US" smtClean="0">
+                          <a:latin typeface="Cambria" panose="02040503050406030204" pitchFamily="18" charset="0"/>
+                        </a:rPr>
+                        <a:t>5</a:t>
+                      </a:r>
+                      <a:endParaRPr lang="en-US" dirty="0">
+                        <a:latin typeface="Cambria" panose="02040503050406030204" pitchFamily="18" charset="0"/>
+                      </a:endParaRPr>
+                    </a:p>
+                  </a:txBody>
+                  <a:tcPr/>
+                </a:tc>
+                <a:tc>
+                  <a:txBody>
+                    <a:bodyPr/>
+                    <a:lstStyle/>
+                    <a:p>
+                      <a:pPr algn="ctr"/>
+                      <a:r>
+                        <a:rPr lang="en-US" sz="1800" b="0" i="0" kern="1200" smtClean="0">
+                          <a:solidFill>
+                            <a:schemeClr val="dk1"/>
+                          </a:solidFill>
+                          <a:effectLst/>
+                          <a:latin typeface="Cambria" panose="02040503050406030204" pitchFamily="18" charset="0"/>
+                          <a:ea typeface="+mn-ea"/>
+                          <a:cs typeface="+mn-cs"/>
+                        </a:rPr>
+                        <a:t>1</a:t>
+                      </a:r>
+                      <a:endParaRPr lang="en-US" dirty="0">
+                        <a:latin typeface="Cambria" panose="02040503050406030204" pitchFamily="18" charset="0"/>
+                      </a:endParaRPr>
+                    </a:p>
+                  </a:txBody>
+                  <a:tcPr/>
+                </a:tc>
+              </a:tr>
+              <a:tr h="360336">
+                <a:tc>
+                  <a:txBody>
+                    <a:bodyPr/>
+                    <a:lstStyle/>
+                    <a:p>
+                      <a:pPr algn="ctr"/>
+                      <a:r>
+                        <a:rPr lang="en-US" smtClean="0">
+                          <a:latin typeface="Cambria" panose="02040503050406030204" pitchFamily="18" charset="0"/>
+                        </a:rPr>
+                        <a:t>6</a:t>
+                      </a:r>
+                      <a:endParaRPr lang="en-US" dirty="0">
+                        <a:latin typeface="Cambria" panose="02040503050406030204" pitchFamily="18" charset="0"/>
+                      </a:endParaRPr>
+                    </a:p>
+                  </a:txBody>
+                  <a:tcPr/>
+                </a:tc>
+                <a:tc>
+                  <a:txBody>
+                    <a:bodyPr/>
+                    <a:lstStyle/>
+                    <a:p>
+                      <a:pPr algn="ctr"/>
+                      <a:r>
+                        <a:rPr lang="en-US" sz="1800" b="0" i="0" kern="1200" smtClean="0">
+                          <a:solidFill>
+                            <a:schemeClr val="dk1"/>
+                          </a:solidFill>
+                          <a:effectLst/>
+                          <a:latin typeface="Cambria" panose="02040503050406030204" pitchFamily="18" charset="0"/>
+                          <a:ea typeface="+mn-ea"/>
+                          <a:cs typeface="+mn-cs"/>
+                        </a:rPr>
+                        <a:t>468.747807122203</a:t>
+                      </a:r>
+                      <a:endParaRPr lang="en-US" dirty="0">
+                        <a:latin typeface="Cambria" panose="02040503050406030204" pitchFamily="18" charset="0"/>
+                      </a:endParaRPr>
+                    </a:p>
+                  </a:txBody>
+                  <a:tcPr/>
+                </a:tc>
+              </a:tr>
+              <a:tr h="360336">
+                <a:tc>
+                  <a:txBody>
+                    <a:bodyPr/>
+                    <a:lstStyle/>
+                    <a:p>
+                      <a:pPr algn="ctr"/>
+                      <a:r>
+                        <a:rPr lang="en-US" smtClean="0">
+                          <a:latin typeface="Cambria" panose="02040503050406030204" pitchFamily="18" charset="0"/>
+                        </a:rPr>
+                        <a:t>7</a:t>
+                      </a:r>
+                      <a:endParaRPr lang="en-US" dirty="0">
+                        <a:latin typeface="Cambria" panose="02040503050406030204" pitchFamily="18" charset="0"/>
+                      </a:endParaRPr>
+                    </a:p>
+                  </a:txBody>
+                  <a:tcPr/>
+                </a:tc>
+                <a:tc>
+                  <a:txBody>
+                    <a:bodyPr/>
+                    <a:lstStyle/>
+                    <a:p>
+                      <a:pPr algn="ctr"/>
+                      <a:r>
+                        <a:rPr lang="vi-VN" sz="1800" b="0" i="0" kern="1200" smtClean="0">
+                          <a:solidFill>
+                            <a:schemeClr val="dk1"/>
+                          </a:solidFill>
+                          <a:effectLst/>
+                          <a:latin typeface="Cambria" panose="02040503050406030204" pitchFamily="18" charset="0"/>
+                          <a:ea typeface="+mn-ea"/>
+                          <a:cs typeface="+mn-cs"/>
+                        </a:rPr>
+                        <a:t>Công Trường Mê Linh</a:t>
+                      </a:r>
+                      <a:endParaRPr lang="en-US" dirty="0">
+                        <a:latin typeface="Cambria" panose="02040503050406030204" pitchFamily="18" charset="0"/>
+                      </a:endParaRPr>
+                    </a:p>
+                  </a:txBody>
+                  <a:tcPr/>
+                </a:tc>
+              </a:tr>
+              <a:tr h="360336">
+                <a:tc>
+                  <a:txBody>
+                    <a:bodyPr/>
+                    <a:lstStyle/>
+                    <a:p>
+                      <a:pPr algn="ctr"/>
+                      <a:r>
+                        <a:rPr lang="en-US" smtClean="0">
+                          <a:latin typeface="Cambria" panose="02040503050406030204" pitchFamily="18" charset="0"/>
+                        </a:rPr>
+                        <a:t>8</a:t>
+                      </a:r>
+                      <a:endParaRPr lang="en-US" dirty="0">
+                        <a:latin typeface="Cambria" panose="02040503050406030204" pitchFamily="18" charset="0"/>
+                      </a:endParaRPr>
+                    </a:p>
+                  </a:txBody>
+                  <a:tcPr/>
+                </a:tc>
+                <a:tc>
+                  <a:txBody>
+                    <a:bodyPr/>
+                    <a:lstStyle/>
+                    <a:p>
+                      <a:pPr algn="ctr"/>
+                      <a:r>
+                        <a:rPr lang="en-US" sz="1800" b="0" i="0" kern="1200" smtClean="0">
+                          <a:solidFill>
+                            <a:schemeClr val="dk1"/>
+                          </a:solidFill>
+                          <a:effectLst/>
+                          <a:latin typeface="Cambria" panose="02040503050406030204" pitchFamily="18" charset="0"/>
+                          <a:ea typeface="+mn-ea"/>
+                          <a:cs typeface="+mn-cs"/>
+                        </a:rPr>
+                        <a:t>106.705856990563</a:t>
+                      </a:r>
+                      <a:endParaRPr lang="en-US" dirty="0">
+                        <a:latin typeface="Cambria" panose="02040503050406030204" pitchFamily="18" charset="0"/>
+                      </a:endParaRPr>
+                    </a:p>
+                  </a:txBody>
+                  <a:tcPr/>
+                </a:tc>
+              </a:tr>
+              <a:tr h="360336">
+                <a:tc>
+                  <a:txBody>
+                    <a:bodyPr/>
+                    <a:lstStyle/>
+                    <a:p>
+                      <a:pPr algn="ctr"/>
+                      <a:r>
+                        <a:rPr lang="en-US" smtClean="0">
+                          <a:latin typeface="Cambria" panose="02040503050406030204" pitchFamily="18" charset="0"/>
+                        </a:rPr>
+                        <a:t>9</a:t>
+                      </a:r>
+                      <a:endParaRPr lang="en-US" dirty="0">
+                        <a:latin typeface="Cambria" panose="02040503050406030204" pitchFamily="18" charset="0"/>
+                      </a:endParaRPr>
+                    </a:p>
+                  </a:txBody>
+                  <a:tcPr/>
+                </a:tc>
+                <a:tc>
+                  <a:txBody>
+                    <a:bodyPr/>
+                    <a:lstStyle/>
+                    <a:p>
+                      <a:pPr algn="ctr"/>
+                      <a:r>
+                        <a:rPr lang="en-US" sz="1800" b="0" i="0" kern="1200" smtClean="0">
+                          <a:solidFill>
+                            <a:schemeClr val="dk1"/>
+                          </a:solidFill>
+                          <a:effectLst/>
+                          <a:latin typeface="Cambria" panose="02040503050406030204" pitchFamily="18" charset="0"/>
+                          <a:ea typeface="+mn-ea"/>
+                          <a:cs typeface="+mn-cs"/>
+                        </a:rPr>
+                        <a:t>10.7767894851893</a:t>
+                      </a:r>
+                      <a:endParaRPr lang="en-US" dirty="0">
+                        <a:latin typeface="Cambria" panose="02040503050406030204" pitchFamily="18" charset="0"/>
+                      </a:endParaRPr>
+                    </a:p>
+                  </a:txBody>
+                  <a:tcPr/>
+                </a:tc>
+              </a:tr>
+              <a:tr h="360336">
+                <a:tc>
+                  <a:txBody>
+                    <a:bodyPr/>
+                    <a:lstStyle/>
+                    <a:p>
+                      <a:pPr algn="ctr"/>
+                      <a:r>
+                        <a:rPr lang="en-US" smtClean="0">
+                          <a:latin typeface="Cambria" panose="02040503050406030204" pitchFamily="18" charset="0"/>
+                        </a:rPr>
+                        <a:t>10</a:t>
+                      </a:r>
+                      <a:endParaRPr lang="en-US" dirty="0">
+                        <a:latin typeface="Cambria" panose="02040503050406030204" pitchFamily="18" charset="0"/>
+                      </a:endParaRPr>
+                    </a:p>
+                  </a:txBody>
+                  <a:tcPr/>
+                </a:tc>
+                <a:tc>
+                  <a:txBody>
+                    <a:bodyPr/>
+                    <a:lstStyle/>
+                    <a:p>
+                      <a:pPr algn="ctr"/>
+                      <a:r>
+                        <a:rPr lang="en-US" sz="1800" b="0" i="0" kern="1200" smtClean="0">
+                          <a:solidFill>
+                            <a:schemeClr val="dk1"/>
+                          </a:solidFill>
+                          <a:effectLst/>
+                          <a:latin typeface="Cambria" panose="02040503050406030204" pitchFamily="18" charset="0"/>
+                          <a:ea typeface="+mn-ea"/>
+                          <a:cs typeface="+mn-cs"/>
+                        </a:rPr>
+                        <a:t>01</a:t>
+                      </a:r>
+                      <a:endParaRPr lang="en-US" dirty="0">
+                        <a:latin typeface="Cambria" panose="02040503050406030204" pitchFamily="18" charset="0"/>
+                      </a:endParaRPr>
+                    </a:p>
+                  </a:txBody>
+                  <a:tcPr/>
+                </a:tc>
+              </a:tr>
+              <a:tr h="360336">
+                <a:tc>
+                  <a:txBody>
+                    <a:bodyPr/>
+                    <a:lstStyle/>
+                    <a:p>
+                      <a:pPr algn="ctr"/>
+                      <a:r>
+                        <a:rPr lang="en-US" smtClean="0">
+                          <a:latin typeface="Cambria" panose="02040503050406030204" pitchFamily="18" charset="0"/>
+                        </a:rPr>
+                        <a:t>11</a:t>
+                      </a:r>
+                      <a:endParaRPr lang="en-US" dirty="0">
+                        <a:latin typeface="Cambria" panose="02040503050406030204" pitchFamily="18" charset="0"/>
+                      </a:endParaRPr>
+                    </a:p>
+                  </a:txBody>
+                  <a:tcPr/>
+                </a:tc>
+                <a:tc>
+                  <a:txBody>
+                    <a:bodyPr/>
+                    <a:lstStyle/>
+                    <a:p>
+                      <a:pPr algn="ctr"/>
+                      <a:r>
+                        <a:rPr lang="en-US" sz="1800" b="1" i="0" kern="1200" dirty="0" err="1" smtClean="0">
+                          <a:solidFill>
+                            <a:srgbClr val="FF0000"/>
+                          </a:solidFill>
+                          <a:effectLst/>
+                          <a:latin typeface="Cambria" panose="02040503050406030204" pitchFamily="18" charset="0"/>
+                          <a:ea typeface="+mn-ea"/>
+                          <a:cs typeface="+mn-cs"/>
+                        </a:rPr>
+                        <a:t>Bến</a:t>
+                      </a:r>
+                      <a:r>
+                        <a:rPr lang="en-US" sz="1800" b="1" i="0" kern="1200" dirty="0" smtClean="0">
+                          <a:solidFill>
+                            <a:srgbClr val="FF0000"/>
+                          </a:solidFill>
+                          <a:effectLst/>
+                          <a:latin typeface="Cambria" panose="02040503050406030204" pitchFamily="18" charset="0"/>
+                          <a:ea typeface="+mn-ea"/>
+                          <a:cs typeface="+mn-cs"/>
+                        </a:rPr>
+                        <a:t> </a:t>
+                      </a:r>
+                      <a:r>
+                        <a:rPr lang="en-US" sz="1800" b="1" i="0" kern="1200" dirty="0" err="1" smtClean="0">
+                          <a:solidFill>
+                            <a:srgbClr val="FF0000"/>
+                          </a:solidFill>
+                          <a:effectLst/>
+                          <a:latin typeface="Cambria" panose="02040503050406030204" pitchFamily="18" charset="0"/>
+                          <a:ea typeface="+mn-ea"/>
+                          <a:cs typeface="+mn-cs"/>
+                        </a:rPr>
+                        <a:t>Thành</a:t>
+                      </a:r>
+                      <a:r>
+                        <a:rPr lang="en-US" sz="1800" b="1" i="0" kern="1200" dirty="0" smtClean="0">
+                          <a:solidFill>
+                            <a:srgbClr val="FF0000"/>
+                          </a:solidFill>
+                          <a:effectLst/>
+                          <a:latin typeface="Cambria" panose="02040503050406030204" pitchFamily="18" charset="0"/>
+                          <a:ea typeface="+mn-ea"/>
+                          <a:cs typeface="+mn-cs"/>
+                        </a:rPr>
+                        <a:t>- BX </a:t>
+                      </a:r>
+                      <a:r>
+                        <a:rPr lang="en-US" sz="1800" b="1" i="0" kern="1200" dirty="0" err="1" smtClean="0">
+                          <a:solidFill>
+                            <a:srgbClr val="FF0000"/>
+                          </a:solidFill>
+                          <a:effectLst/>
+                          <a:latin typeface="Cambria" panose="02040503050406030204" pitchFamily="18" charset="0"/>
+                          <a:ea typeface="+mn-ea"/>
+                          <a:cs typeface="+mn-cs"/>
+                        </a:rPr>
+                        <a:t>Chợ</a:t>
+                      </a:r>
+                      <a:r>
+                        <a:rPr lang="en-US" sz="1800" b="1" i="0" kern="1200" dirty="0" smtClean="0">
+                          <a:solidFill>
+                            <a:srgbClr val="FF0000"/>
+                          </a:solidFill>
+                          <a:effectLst/>
+                          <a:latin typeface="Cambria" panose="02040503050406030204" pitchFamily="18" charset="0"/>
+                          <a:ea typeface="+mn-ea"/>
+                          <a:cs typeface="+mn-cs"/>
+                        </a:rPr>
+                        <a:t> </a:t>
+                      </a:r>
+                      <a:r>
+                        <a:rPr lang="en-US" sz="1800" b="1" i="0" kern="1200" dirty="0" err="1" smtClean="0">
+                          <a:solidFill>
+                            <a:srgbClr val="FF0000"/>
+                          </a:solidFill>
+                          <a:effectLst/>
+                          <a:latin typeface="Cambria" panose="02040503050406030204" pitchFamily="18" charset="0"/>
+                          <a:ea typeface="+mn-ea"/>
+                          <a:cs typeface="+mn-cs"/>
+                        </a:rPr>
+                        <a:t>Lớn</a:t>
+                      </a:r>
+                      <a:endParaRPr lang="en-US" b="1" dirty="0">
+                        <a:solidFill>
+                          <a:srgbClr val="FF0000"/>
+                        </a:solidFill>
+                        <a:latin typeface="Cambria" panose="02040503050406030204" pitchFamily="18" charset="0"/>
+                      </a:endParaRPr>
+                    </a:p>
+                  </a:txBody>
+                  <a:tcPr/>
+                </a:tc>
+              </a:tr>
+              <a:tr h="360336">
+                <a:tc>
+                  <a:txBody>
+                    <a:bodyPr/>
+                    <a:lstStyle/>
+                    <a:p>
+                      <a:pPr algn="ctr"/>
+                      <a:r>
+                        <a:rPr lang="en-US" smtClean="0">
+                          <a:latin typeface="Cambria" panose="02040503050406030204" pitchFamily="18" charset="0"/>
+                        </a:rPr>
+                        <a:t>12</a:t>
+                      </a:r>
+                      <a:endParaRPr lang="en-US" dirty="0">
+                        <a:latin typeface="Cambria" panose="02040503050406030204" pitchFamily="18" charset="0"/>
+                      </a:endParaRPr>
+                    </a:p>
+                  </a:txBody>
+                  <a:tcPr/>
+                </a:tc>
+                <a:tc>
+                  <a:txBody>
+                    <a:bodyPr/>
+                    <a:lstStyle/>
+                    <a:p>
+                      <a:pPr algn="ctr"/>
+                      <a:r>
+                        <a:rPr lang="vi-VN" sz="1800" b="0" i="0" kern="1200" smtClean="0">
+                          <a:solidFill>
+                            <a:schemeClr val="dk1"/>
+                          </a:solidFill>
+                          <a:effectLst/>
+                          <a:latin typeface="Cambria" panose="02040503050406030204" pitchFamily="18" charset="0"/>
+                          <a:ea typeface="+mn-ea"/>
+                          <a:cs typeface="+mn-cs"/>
+                        </a:rPr>
+                        <a:t>Công trường Mê Linh, Thi Sách, Quận 1</a:t>
+                      </a:r>
+                      <a:endParaRPr lang="en-US" dirty="0">
+                        <a:latin typeface="Cambria" panose="02040503050406030204" pitchFamily="18" charset="0"/>
+                      </a:endParaRPr>
+                    </a:p>
+                  </a:txBody>
+                  <a:tcPr/>
+                </a:tc>
+              </a:tr>
+              <a:tr h="360336">
+                <a:tc>
+                  <a:txBody>
+                    <a:bodyPr/>
+                    <a:lstStyle/>
+                    <a:p>
+                      <a:pPr algn="ctr"/>
+                      <a:r>
+                        <a:rPr lang="en-US" smtClean="0">
+                          <a:latin typeface="Cambria" panose="02040503050406030204" pitchFamily="18" charset="0"/>
+                        </a:rPr>
+                        <a:t>13</a:t>
+                      </a:r>
+                      <a:endParaRPr lang="en-US" dirty="0">
+                        <a:latin typeface="Cambria" panose="02040503050406030204" pitchFamily="18" charset="0"/>
+                      </a:endParaRPr>
+                    </a:p>
+                  </a:txBody>
+                  <a:tcPr/>
+                </a:tc>
+                <a:tc>
+                  <a:txBody>
+                    <a:bodyPr/>
+                    <a:lstStyle/>
+                    <a:p>
+                      <a:pPr algn="ctr"/>
+                      <a:r>
+                        <a:rPr lang="en-US" sz="1800" b="0" i="0" kern="1200" dirty="0" smtClean="0">
+                          <a:solidFill>
+                            <a:schemeClr val="dk1"/>
+                          </a:solidFill>
+                          <a:effectLst/>
+                          <a:latin typeface="Cambria" panose="02040503050406030204" pitchFamily="18" charset="0"/>
+                          <a:ea typeface="+mn-ea"/>
+                          <a:cs typeface="+mn-cs"/>
+                        </a:rPr>
+                        <a:t>BX06</a:t>
+                      </a:r>
+                      <a:endParaRPr lang="en-US" dirty="0">
+                        <a:latin typeface="Cambria" panose="02040503050406030204" pitchFamily="18" charset="0"/>
+                      </a:endParaRPr>
+                    </a:p>
+                  </a:txBody>
+                  <a:tcPr/>
+                </a:tc>
+              </a:tr>
+            </a:tbl>
+          </a:graphicData>
+        </a:graphic>
+      </p:graphicFrame>
+      <p:sp>
+        <p:nvSpPr>
+          <p:cNvPr id="5" name="Rectangle 4"/>
+          <p:cNvSpPr/>
+          <p:nvPr/>
+        </p:nvSpPr>
+        <p:spPr>
+          <a:xfrm>
+            <a:off x="617220" y="6344920"/>
+            <a:ext cx="7490460" cy="369332"/>
+          </a:xfrm>
+          <a:prstGeom prst="rect">
+            <a:avLst/>
+          </a:prstGeom>
+        </p:spPr>
+        <p:txBody>
+          <a:bodyPr wrap="square">
+            <a:spAutoFit/>
+          </a:bodyPr>
+          <a:lstStyle/>
+          <a:p>
+            <a:r>
+              <a:rPr lang="en-US" dirty="0" smtClean="0"/>
+              <a:t>http://mapbus.ebms.vn/ajax.aspx?action=listRouteStations&amp;</a:t>
+            </a:r>
+            <a:r>
+              <a:rPr lang="en-US" dirty="0" smtClean="0">
+                <a:solidFill>
+                  <a:srgbClr val="FF0000"/>
+                </a:solidFill>
+              </a:rPr>
+              <a:t>rid=1</a:t>
+            </a:r>
+            <a:r>
+              <a:rPr lang="en-US" dirty="0" smtClean="0"/>
+              <a:t>&amp;</a:t>
+            </a:r>
+            <a:r>
+              <a:rPr lang="en-US" dirty="0" smtClean="0">
+                <a:solidFill>
+                  <a:srgbClr val="FF0000"/>
+                </a:solidFill>
+              </a:rPr>
+              <a:t>isgo=true</a:t>
+            </a:r>
+            <a:endParaRPr lang="en-US" dirty="0">
+              <a:solidFill>
+                <a:srgbClr val="FF0000"/>
+              </a:solidFill>
+            </a:endParaRPr>
+          </a:p>
+        </p:txBody>
+      </p:sp>
+      <p:graphicFrame>
+        <p:nvGraphicFramePr>
+          <p:cNvPr id="6" name="Table 5"/>
+          <p:cNvGraphicFramePr>
+            <a:graphicFrameLocks noGrp="1"/>
+          </p:cNvGraphicFramePr>
+          <p:nvPr>
+            <p:extLst>
+              <p:ext uri="{D42A27DB-BD31-4B8C-83A1-F6EECF244321}">
+                <p14:modId xmlns:p14="http://schemas.microsoft.com/office/powerpoint/2010/main" val="1884562370"/>
+              </p:ext>
+            </p:extLst>
+          </p:nvPr>
+        </p:nvGraphicFramePr>
+        <p:xfrm>
+          <a:off x="6694205" y="2349666"/>
+          <a:ext cx="1749039" cy="1487396"/>
+        </p:xfrm>
+        <a:graphic>
+          <a:graphicData uri="http://schemas.openxmlformats.org/drawingml/2006/table">
+            <a:tbl>
+              <a:tblPr firstRow="1" bandRow="1">
+                <a:tableStyleId>{21E4AEA4-8DFA-4A89-87EB-49C32662AFE0}</a:tableStyleId>
+              </a:tblPr>
+              <a:tblGrid>
+                <a:gridCol w="1749039"/>
+              </a:tblGrid>
+              <a:tr h="371849">
+                <a:tc>
+                  <a:txBody>
+                    <a:bodyPr/>
+                    <a:lstStyle/>
+                    <a:p>
+                      <a:pPr algn="ctr"/>
+                      <a:r>
+                        <a:rPr lang="en-US" dirty="0" smtClean="0"/>
+                        <a:t>Route</a:t>
+                      </a:r>
+                      <a:endParaRPr lang="en-US" dirty="0"/>
+                    </a:p>
+                  </a:txBody>
+                  <a:tcPr/>
+                </a:tc>
+              </a:tr>
+              <a:tr h="371849">
+                <a:tc>
+                  <a:txBody>
+                    <a:bodyPr/>
+                    <a:lstStyle/>
+                    <a:p>
+                      <a:r>
+                        <a:rPr lang="en-US" dirty="0" err="1" smtClean="0"/>
+                        <a:t>RouteType</a:t>
+                      </a:r>
+                      <a:endParaRPr lang="en-US" dirty="0"/>
+                    </a:p>
+                  </a:txBody>
+                  <a:tcPr/>
+                </a:tc>
+              </a:tr>
+              <a:tr h="371849">
+                <a:tc>
+                  <a:txBody>
+                    <a:bodyPr/>
+                    <a:lstStyle/>
+                    <a:p>
+                      <a:r>
+                        <a:rPr lang="en-US" dirty="0" err="1" smtClean="0"/>
+                        <a:t>RouteNo</a:t>
+                      </a:r>
+                      <a:endParaRPr lang="en-US" dirty="0"/>
+                    </a:p>
+                  </a:txBody>
+                  <a:tcPr/>
+                </a:tc>
+              </a:tr>
+              <a:tr h="371849">
+                <a:tc>
+                  <a:txBody>
+                    <a:bodyPr/>
+                    <a:lstStyle/>
+                    <a:p>
+                      <a:r>
+                        <a:rPr lang="en-US" dirty="0" err="1" smtClean="0"/>
+                        <a:t>RouteName</a:t>
+                      </a:r>
+                      <a:endParaRPr lang="en-US" dirty="0"/>
+                    </a:p>
+                  </a:txBody>
+                  <a:tcPr/>
+                </a:tc>
+              </a:tr>
+            </a:tbl>
+          </a:graphicData>
+        </a:graphic>
+      </p:graphicFrame>
+      <p:cxnSp>
+        <p:nvCxnSpPr>
+          <p:cNvPr id="7" name="Straight Arrow Connector 6"/>
+          <p:cNvCxnSpPr/>
+          <p:nvPr/>
+        </p:nvCxnSpPr>
+        <p:spPr>
+          <a:xfrm flipV="1">
+            <a:off x="4480560" y="3640508"/>
+            <a:ext cx="2279163" cy="1774774"/>
+          </a:xfrm>
+          <a:prstGeom prst="straightConnector1">
+            <a:avLst/>
+          </a:prstGeom>
+          <a:ln>
+            <a:tailEnd type="triangle"/>
+          </a:ln>
+        </p:spPr>
+        <p:style>
+          <a:lnRef idx="3">
+            <a:schemeClr val="accent2"/>
+          </a:lnRef>
+          <a:fillRef idx="0">
+            <a:schemeClr val="accent2"/>
+          </a:fillRef>
+          <a:effectRef idx="2">
+            <a:schemeClr val="accent2"/>
+          </a:effectRef>
+          <a:fontRef idx="minor">
+            <a:schemeClr val="tx1"/>
+          </a:fontRef>
+        </p:style>
+      </p:cxnSp>
+      <p:pic>
+        <p:nvPicPr>
+          <p:cNvPr id="9" name="Picture 8"/>
+          <p:cNvPicPr>
+            <a:picLocks noChangeAspect="1"/>
+          </p:cNvPicPr>
+          <p:nvPr/>
+        </p:nvPicPr>
+        <p:blipFill>
+          <a:blip r:embed="rId2">
+            <a:extLst>
+              <a:ext uri="{28A0092B-C50C-407E-A947-70E740481C1C}">
+                <a14:useLocalDpi xmlns:a14="http://schemas.microsoft.com/office/drawing/2010/main" val="0"/>
+              </a:ext>
+            </a:extLst>
+          </a:blip>
+          <a:stretch>
+            <a:fillRect/>
+          </a:stretch>
+        </p:blipFill>
+        <p:spPr>
+          <a:xfrm>
+            <a:off x="86063" y="672289"/>
+            <a:ext cx="6784756" cy="443863"/>
+          </a:xfrm>
+          <a:prstGeom prst="rect">
+            <a:avLst/>
+          </a:prstGeom>
+        </p:spPr>
+      </p:pic>
+      <p:cxnSp>
+        <p:nvCxnSpPr>
+          <p:cNvPr id="11" name="Straight Arrow Connector 10"/>
+          <p:cNvCxnSpPr/>
+          <p:nvPr/>
+        </p:nvCxnSpPr>
+        <p:spPr>
+          <a:xfrm flipH="1" flipV="1">
+            <a:off x="1640793" y="1034041"/>
+            <a:ext cx="1162229" cy="4187439"/>
+          </a:xfrm>
+          <a:prstGeom prst="straightConnector1">
+            <a:avLst/>
+          </a:prstGeom>
+          <a:ln>
+            <a:tailEnd type="triangle"/>
+          </a:ln>
+        </p:spPr>
+        <p:style>
+          <a:lnRef idx="3">
+            <a:schemeClr val="accent2"/>
+          </a:lnRef>
+          <a:fillRef idx="0">
+            <a:schemeClr val="accent2"/>
+          </a:fillRef>
+          <a:effectRef idx="2">
+            <a:schemeClr val="accent2"/>
+          </a:effectRef>
+          <a:fontRef idx="minor">
+            <a:schemeClr val="tx1"/>
+          </a:fontRef>
+        </p:style>
+      </p:cxnSp>
+    </p:spTree>
+    <p:extLst>
+      <p:ext uri="{BB962C8B-B14F-4D97-AF65-F5344CB8AC3E}">
+        <p14:creationId xmlns:p14="http://schemas.microsoft.com/office/powerpoint/2010/main" val="3066861398"/>
       </p:ext>
     </p:extLst>
   </p:cSld>

</xml_diff>